<commit_message>
add networking forensics draft. incompleted!
</commit_message>
<xml_diff>
--- a/Networking_Forensics/80_DNS_Spoof_Forensics.pptx
+++ b/Networking_Forensics/80_DNS_Spoof_Forensics.pptx
@@ -5,14 +5,23 @@
     <p:sldMasterId id="2147483648" r:id="rId1"/>
   </p:sldMasterIdLst>
   <p:notesMasterIdLst>
-    <p:notesMasterId r:id="rId7"/>
+    <p:notesMasterId r:id="rId16"/>
   </p:notesMasterIdLst>
   <p:sldIdLst>
     <p:sldId id="256" r:id="rId2"/>
-    <p:sldId id="526" r:id="rId3"/>
-    <p:sldId id="537" r:id="rId4"/>
-    <p:sldId id="533" r:id="rId5"/>
-    <p:sldId id="522" r:id="rId6"/>
+    <p:sldId id="539" r:id="rId3"/>
+    <p:sldId id="526" r:id="rId4"/>
+    <p:sldId id="537" r:id="rId5"/>
+    <p:sldId id="533" r:id="rId6"/>
+    <p:sldId id="538" r:id="rId7"/>
+    <p:sldId id="540" r:id="rId8"/>
+    <p:sldId id="543" r:id="rId9"/>
+    <p:sldId id="522" r:id="rId10"/>
+    <p:sldId id="541" r:id="rId11"/>
+    <p:sldId id="542" r:id="rId12"/>
+    <p:sldId id="544" r:id="rId13"/>
+    <p:sldId id="545" r:id="rId14"/>
+    <p:sldId id="546" r:id="rId15"/>
   </p:sldIdLst>
   <p:sldSz cx="12192000" cy="6858000"/>
   <p:notesSz cx="6858000" cy="9144000"/>
@@ -122,6 +131,7 @@
 <file path=ppt/revisionInfo.xml><?xml version="1.0" encoding="utf-8"?>
 <p1510:revInfo xmlns:a="http://schemas.openxmlformats.org/drawingml/2006/main" xmlns:r="http://schemas.openxmlformats.org/officeDocument/2006/relationships" xmlns:p1510="http://schemas.microsoft.com/office/powerpoint/2015/10/main">
   <p1510:revLst>
+    <p1510:client id="{DD1FDF10-7D46-46BB-AFF8-9771F1571229}" v="4" dt="2023-03-16T03:13:09.605"/>
     <p1510:client id="{EC5FAB8D-8A6B-47C4-B6ED-4448F2E7B7E9}" v="117" dt="2023-03-15T03:39:04.808"/>
   </p1510:revLst>
 </p1510:revInfo>
@@ -9613,8 +9623,8 @@
   </pc:docChgLst>
   <pc:docChgLst>
     <pc:chgData name="Weifeng Xu" userId="e7aed605-a3dd-4d5a-a692-a87037af107b" providerId="ADAL" clId="{DD1FDF10-7D46-46BB-AFF8-9771F1571229}"/>
-    <pc:docChg chg="custSel delSld modSld">
-      <pc:chgData name="Weifeng Xu" userId="e7aed605-a3dd-4d5a-a692-a87037af107b" providerId="ADAL" clId="{DD1FDF10-7D46-46BB-AFF8-9771F1571229}" dt="2023-03-16T02:07:58.213" v="101" actId="1076"/>
+    <pc:docChg chg="undo custSel addSld delSld modSld sldOrd">
+      <pc:chgData name="Weifeng Xu" userId="e7aed605-a3dd-4d5a-a692-a87037af107b" providerId="ADAL" clId="{DD1FDF10-7D46-46BB-AFF8-9771F1571229}" dt="2023-03-16T03:22:18.255" v="889" actId="1076"/>
       <pc:docMkLst>
         <pc:docMk/>
       </pc:docMkLst>
@@ -9755,6 +9765,21 @@
           <pc:sldMk cId="567914098" sldId="525"/>
         </pc:sldMkLst>
       </pc:sldChg>
+      <pc:sldChg chg="modSp mod">
+        <pc:chgData name="Weifeng Xu" userId="e7aed605-a3dd-4d5a-a692-a87037af107b" providerId="ADAL" clId="{DD1FDF10-7D46-46BB-AFF8-9771F1571229}" dt="2023-03-16T02:21:33.278" v="415" actId="20577"/>
+        <pc:sldMkLst>
+          <pc:docMk/>
+          <pc:sldMk cId="1279404334" sldId="526"/>
+        </pc:sldMkLst>
+        <pc:spChg chg="mod">
+          <ac:chgData name="Weifeng Xu" userId="e7aed605-a3dd-4d5a-a692-a87037af107b" providerId="ADAL" clId="{DD1FDF10-7D46-46BB-AFF8-9771F1571229}" dt="2023-03-16T02:21:33.278" v="415" actId="20577"/>
+          <ac:spMkLst>
+            <pc:docMk/>
+            <pc:sldMk cId="1279404334" sldId="526"/>
+            <ac:spMk id="2" creationId="{767E8846-E0B6-465F-E6E1-CC9D6315DA79}"/>
+          </ac:spMkLst>
+        </pc:spChg>
+      </pc:sldChg>
       <pc:sldChg chg="del">
         <pc:chgData name="Weifeng Xu" userId="e7aed605-a3dd-4d5a-a692-a87037af107b" providerId="ADAL" clId="{DD1FDF10-7D46-46BB-AFF8-9771F1571229}" dt="2023-03-16T00:18:36.951" v="48" actId="47"/>
         <pc:sldMkLst>
@@ -9790,8 +9815,8 @@
           <pc:sldMk cId="3443128300" sldId="531"/>
         </pc:sldMkLst>
       </pc:sldChg>
-      <pc:sldChg chg="addSp modSp mod modClrScheme chgLayout">
-        <pc:chgData name="Weifeng Xu" userId="e7aed605-a3dd-4d5a-a692-a87037af107b" providerId="ADAL" clId="{DD1FDF10-7D46-46BB-AFF8-9771F1571229}" dt="2023-03-16T02:07:58.213" v="101" actId="1076"/>
+      <pc:sldChg chg="addSp modSp mod modClrScheme chgLayout modNotesTx">
+        <pc:chgData name="Weifeng Xu" userId="e7aed605-a3dd-4d5a-a692-a87037af107b" providerId="ADAL" clId="{DD1FDF10-7D46-46BB-AFF8-9771F1571229}" dt="2023-03-16T02:16:15.252" v="177" actId="20577"/>
         <pc:sldMkLst>
           <pc:docMk/>
           <pc:sldMk cId="2296059887" sldId="533"/>
@@ -9804,8 +9829,24 @@
             <ac:spMk id="6" creationId="{CDED9527-F8EE-A1A1-BABC-8A21A3501734}"/>
           </ac:spMkLst>
         </pc:spChg>
+        <pc:spChg chg="add mod">
+          <ac:chgData name="Weifeng Xu" userId="e7aed605-a3dd-4d5a-a692-a87037af107b" providerId="ADAL" clId="{DD1FDF10-7D46-46BB-AFF8-9771F1571229}" dt="2023-03-16T02:15:19.919" v="135" actId="207"/>
+          <ac:spMkLst>
+            <pc:docMk/>
+            <pc:sldMk cId="2296059887" sldId="533"/>
+            <ac:spMk id="9" creationId="{B7126E41-760A-3C91-7A48-1F87D4DFB137}"/>
+          </ac:spMkLst>
+        </pc:spChg>
+        <pc:spChg chg="add mod">
+          <ac:chgData name="Weifeng Xu" userId="e7aed605-a3dd-4d5a-a692-a87037af107b" providerId="ADAL" clId="{DD1FDF10-7D46-46BB-AFF8-9771F1571229}" dt="2023-03-16T02:16:15.252" v="177" actId="20577"/>
+          <ac:spMkLst>
+            <pc:docMk/>
+            <pc:sldMk cId="2296059887" sldId="533"/>
+            <ac:spMk id="10" creationId="{095C1DA7-21F6-7FCE-ACAB-5651011FC42C}"/>
+          </ac:spMkLst>
+        </pc:spChg>
         <pc:picChg chg="add mod">
-          <ac:chgData name="Weifeng Xu" userId="e7aed605-a3dd-4d5a-a692-a87037af107b" providerId="ADAL" clId="{DD1FDF10-7D46-46BB-AFF8-9771F1571229}" dt="2023-03-16T02:07:55.112" v="100" actId="1076"/>
+          <ac:chgData name="Weifeng Xu" userId="e7aed605-a3dd-4d5a-a692-a87037af107b" providerId="ADAL" clId="{DD1FDF10-7D46-46BB-AFF8-9771F1571229}" dt="2023-03-16T02:15:08.119" v="110" actId="1076"/>
           <ac:picMkLst>
             <pc:docMk/>
             <pc:sldMk cId="2296059887" sldId="533"/>
@@ -9813,13 +9854,21 @@
           </ac:picMkLst>
         </pc:picChg>
         <pc:picChg chg="add mod">
-          <ac:chgData name="Weifeng Xu" userId="e7aed605-a3dd-4d5a-a692-a87037af107b" providerId="ADAL" clId="{DD1FDF10-7D46-46BB-AFF8-9771F1571229}" dt="2023-03-16T02:07:58.213" v="101" actId="1076"/>
+          <ac:chgData name="Weifeng Xu" userId="e7aed605-a3dd-4d5a-a692-a87037af107b" providerId="ADAL" clId="{DD1FDF10-7D46-46BB-AFF8-9771F1571229}" dt="2023-03-16T02:14:50.348" v="108" actId="1076"/>
           <ac:picMkLst>
             <pc:docMk/>
             <pc:sldMk cId="2296059887" sldId="533"/>
             <ac:picMk id="5" creationId="{3D83884C-174C-887F-8F55-C2D9287CB814}"/>
           </ac:picMkLst>
         </pc:picChg>
+        <pc:picChg chg="add mod">
+          <ac:chgData name="Weifeng Xu" userId="e7aed605-a3dd-4d5a-a692-a87037af107b" providerId="ADAL" clId="{DD1FDF10-7D46-46BB-AFF8-9771F1571229}" dt="2023-03-16T02:15:04.659" v="109" actId="1076"/>
+          <ac:picMkLst>
+            <pc:docMk/>
+            <pc:sldMk cId="2296059887" sldId="533"/>
+            <ac:picMk id="8" creationId="{EB069F6C-17EF-F640-D041-C5FC652455D6}"/>
+          </ac:picMkLst>
+        </pc:picChg>
       </pc:sldChg>
       <pc:sldChg chg="del">
         <pc:chgData name="Weifeng Xu" userId="e7aed605-a3dd-4d5a-a692-a87037af107b" providerId="ADAL" clId="{DD1FDF10-7D46-46BB-AFF8-9771F1571229}" dt="2023-03-16T00:18:36.979" v="49" actId="47"/>
@@ -9841,6 +9890,261 @@
           <pc:docMk/>
           <pc:sldMk cId="1723666245" sldId="536"/>
         </pc:sldMkLst>
+      </pc:sldChg>
+      <pc:sldChg chg="addSp delSp modSp new mod modClrScheme chgLayout">
+        <pc:chgData name="Weifeng Xu" userId="e7aed605-a3dd-4d5a-a692-a87037af107b" providerId="ADAL" clId="{DD1FDF10-7D46-46BB-AFF8-9771F1571229}" dt="2023-03-16T02:17:19.926" v="205" actId="14100"/>
+        <pc:sldMkLst>
+          <pc:docMk/>
+          <pc:sldMk cId="1410457836" sldId="538"/>
+        </pc:sldMkLst>
+        <pc:spChg chg="del">
+          <ac:chgData name="Weifeng Xu" userId="e7aed605-a3dd-4d5a-a692-a87037af107b" providerId="ADAL" clId="{DD1FDF10-7D46-46BB-AFF8-9771F1571229}" dt="2023-03-16T02:16:43.667" v="179" actId="700"/>
+          <ac:spMkLst>
+            <pc:docMk/>
+            <pc:sldMk cId="1410457836" sldId="538"/>
+            <ac:spMk id="2" creationId="{F5891FAF-3FDE-3861-15B4-89D5B74EAD23}"/>
+          </ac:spMkLst>
+        </pc:spChg>
+        <pc:spChg chg="add mod ord">
+          <ac:chgData name="Weifeng Xu" userId="e7aed605-a3dd-4d5a-a692-a87037af107b" providerId="ADAL" clId="{DD1FDF10-7D46-46BB-AFF8-9771F1571229}" dt="2023-03-16T02:17:15.186" v="203" actId="20577"/>
+          <ac:spMkLst>
+            <pc:docMk/>
+            <pc:sldMk cId="1410457836" sldId="538"/>
+            <ac:spMk id="5" creationId="{3DC15AD9-48AB-C676-CBD3-BEDA416B307F}"/>
+          </ac:spMkLst>
+        </pc:spChg>
+        <pc:picChg chg="add mod">
+          <ac:chgData name="Weifeng Xu" userId="e7aed605-a3dd-4d5a-a692-a87037af107b" providerId="ADAL" clId="{DD1FDF10-7D46-46BB-AFF8-9771F1571229}" dt="2023-03-16T02:17:19.926" v="205" actId="14100"/>
+          <ac:picMkLst>
+            <pc:docMk/>
+            <pc:sldMk cId="1410457836" sldId="538"/>
+            <ac:picMk id="4" creationId="{BDB3DBD8-215E-64FE-ACF6-E5B24E097559}"/>
+          </ac:picMkLst>
+        </pc:picChg>
+      </pc:sldChg>
+      <pc:sldChg chg="addSp modSp new mod ord modClrScheme chgLayout">
+        <pc:chgData name="Weifeng Xu" userId="e7aed605-a3dd-4d5a-a692-a87037af107b" providerId="ADAL" clId="{DD1FDF10-7D46-46BB-AFF8-9771F1571229}" dt="2023-03-16T02:20:14.640" v="403"/>
+        <pc:sldMkLst>
+          <pc:docMk/>
+          <pc:sldMk cId="1108051047" sldId="539"/>
+        </pc:sldMkLst>
+        <pc:spChg chg="add mod">
+          <ac:chgData name="Weifeng Xu" userId="e7aed605-a3dd-4d5a-a692-a87037af107b" providerId="ADAL" clId="{DD1FDF10-7D46-46BB-AFF8-9771F1571229}" dt="2023-03-16T02:17:38.347" v="211" actId="20577"/>
+          <ac:spMkLst>
+            <pc:docMk/>
+            <pc:sldMk cId="1108051047" sldId="539"/>
+            <ac:spMk id="2" creationId="{C1A452AF-C3DC-B666-CC29-6495F232FE83}"/>
+          </ac:spMkLst>
+        </pc:spChg>
+        <pc:spChg chg="add mod">
+          <ac:chgData name="Weifeng Xu" userId="e7aed605-a3dd-4d5a-a692-a87037af107b" providerId="ADAL" clId="{DD1FDF10-7D46-46BB-AFF8-9771F1571229}" dt="2023-03-16T02:19:54.879" v="401" actId="20577"/>
+          <ac:spMkLst>
+            <pc:docMk/>
+            <pc:sldMk cId="1108051047" sldId="539"/>
+            <ac:spMk id="3" creationId="{D5F630AB-CF76-2187-0ADB-0D662FC201D8}"/>
+          </ac:spMkLst>
+        </pc:spChg>
+      </pc:sldChg>
+      <pc:sldChg chg="addSp modSp new mod modClrScheme chgLayout">
+        <pc:chgData name="Weifeng Xu" userId="e7aed605-a3dd-4d5a-a692-a87037af107b" providerId="ADAL" clId="{DD1FDF10-7D46-46BB-AFF8-9771F1571229}" dt="2023-03-16T02:58:49.968" v="760" actId="20577"/>
+        <pc:sldMkLst>
+          <pc:docMk/>
+          <pc:sldMk cId="275395023" sldId="540"/>
+        </pc:sldMkLst>
+        <pc:spChg chg="mod ord">
+          <ac:chgData name="Weifeng Xu" userId="e7aed605-a3dd-4d5a-a692-a87037af107b" providerId="ADAL" clId="{DD1FDF10-7D46-46BB-AFF8-9771F1571229}" dt="2023-03-16T02:54:53.316" v="492" actId="20577"/>
+          <ac:spMkLst>
+            <pc:docMk/>
+            <pc:sldMk cId="275395023" sldId="540"/>
+            <ac:spMk id="2" creationId="{1DED2B73-B5A5-0FC3-6C76-1CA7CA6FE34E}"/>
+          </ac:spMkLst>
+        </pc:spChg>
+        <pc:spChg chg="add mod ord">
+          <ac:chgData name="Weifeng Xu" userId="e7aed605-a3dd-4d5a-a692-a87037af107b" providerId="ADAL" clId="{DD1FDF10-7D46-46BB-AFF8-9771F1571229}" dt="2023-03-16T02:58:49.968" v="760" actId="20577"/>
+          <ac:spMkLst>
+            <pc:docMk/>
+            <pc:sldMk cId="275395023" sldId="540"/>
+            <ac:spMk id="3" creationId="{E8FABC38-D5BF-7154-59E7-94AC3EFBBB0A}"/>
+          </ac:spMkLst>
+        </pc:spChg>
+      </pc:sldChg>
+      <pc:sldChg chg="addSp modSp new mod">
+        <pc:chgData name="Weifeng Xu" userId="e7aed605-a3dd-4d5a-a692-a87037af107b" providerId="ADAL" clId="{DD1FDF10-7D46-46BB-AFF8-9771F1571229}" dt="2023-03-16T02:32:16.711" v="435" actId="13822"/>
+        <pc:sldMkLst>
+          <pc:docMk/>
+          <pc:sldMk cId="3797123336" sldId="541"/>
+        </pc:sldMkLst>
+        <pc:picChg chg="add mod">
+          <ac:chgData name="Weifeng Xu" userId="e7aed605-a3dd-4d5a-a692-a87037af107b" providerId="ADAL" clId="{DD1FDF10-7D46-46BB-AFF8-9771F1571229}" dt="2023-03-16T02:29:32.734" v="431" actId="1076"/>
+          <ac:picMkLst>
+            <pc:docMk/>
+            <pc:sldMk cId="3797123336" sldId="541"/>
+            <ac:picMk id="3" creationId="{C3478EC3-E481-6FC5-F4A6-0BB9849BFA65}"/>
+          </ac:picMkLst>
+        </pc:picChg>
+        <pc:picChg chg="add mod">
+          <ac:chgData name="Weifeng Xu" userId="e7aed605-a3dd-4d5a-a692-a87037af107b" providerId="ADAL" clId="{DD1FDF10-7D46-46BB-AFF8-9771F1571229}" dt="2023-03-16T02:29:31.474" v="430" actId="1076"/>
+          <ac:picMkLst>
+            <pc:docMk/>
+            <pc:sldMk cId="3797123336" sldId="541"/>
+            <ac:picMk id="5" creationId="{8B97AD07-B226-E2E5-E076-531CF5DAAE61}"/>
+          </ac:picMkLst>
+        </pc:picChg>
+        <pc:picChg chg="add mod">
+          <ac:chgData name="Weifeng Xu" userId="e7aed605-a3dd-4d5a-a692-a87037af107b" providerId="ADAL" clId="{DD1FDF10-7D46-46BB-AFF8-9771F1571229}" dt="2023-03-16T02:32:08.006" v="433" actId="1076"/>
+          <ac:picMkLst>
+            <pc:docMk/>
+            <pc:sldMk cId="3797123336" sldId="541"/>
+            <ac:picMk id="7" creationId="{D42E6D75-3AAF-B1C7-79E1-67AC7403B6BC}"/>
+          </ac:picMkLst>
+        </pc:picChg>
+        <pc:cxnChg chg="add mod">
+          <ac:chgData name="Weifeng Xu" userId="e7aed605-a3dd-4d5a-a692-a87037af107b" providerId="ADAL" clId="{DD1FDF10-7D46-46BB-AFF8-9771F1571229}" dt="2023-03-16T02:32:16.711" v="435" actId="13822"/>
+          <ac:cxnSpMkLst>
+            <pc:docMk/>
+            <pc:sldMk cId="3797123336" sldId="541"/>
+            <ac:cxnSpMk id="9" creationId="{95BA2671-98E3-7665-8399-0BFE1BC47E22}"/>
+          </ac:cxnSpMkLst>
+        </pc:cxnChg>
+      </pc:sldChg>
+      <pc:sldChg chg="addSp new mod">
+        <pc:chgData name="Weifeng Xu" userId="e7aed605-a3dd-4d5a-a692-a87037af107b" providerId="ADAL" clId="{DD1FDF10-7D46-46BB-AFF8-9771F1571229}" dt="2023-03-16T02:52:56.286" v="437" actId="22"/>
+        <pc:sldMkLst>
+          <pc:docMk/>
+          <pc:sldMk cId="186619071" sldId="542"/>
+        </pc:sldMkLst>
+        <pc:picChg chg="add">
+          <ac:chgData name="Weifeng Xu" userId="e7aed605-a3dd-4d5a-a692-a87037af107b" providerId="ADAL" clId="{DD1FDF10-7D46-46BB-AFF8-9771F1571229}" dt="2023-03-16T02:52:56.286" v="437" actId="22"/>
+          <ac:picMkLst>
+            <pc:docMk/>
+            <pc:sldMk cId="186619071" sldId="542"/>
+            <ac:picMk id="3" creationId="{57986488-3059-4494-ADDA-5F5FB07CC451}"/>
+          </ac:picMkLst>
+        </pc:picChg>
+      </pc:sldChg>
+      <pc:sldChg chg="addSp delSp modSp new mod setBg modClrScheme chgLayout modNotesTx">
+        <pc:chgData name="Weifeng Xu" userId="e7aed605-a3dd-4d5a-a692-a87037af107b" providerId="ADAL" clId="{DD1FDF10-7D46-46BB-AFF8-9771F1571229}" dt="2023-03-16T03:07:44.151" v="787"/>
+        <pc:sldMkLst>
+          <pc:docMk/>
+          <pc:sldMk cId="3350146509" sldId="543"/>
+        </pc:sldMkLst>
+        <pc:spChg chg="mod ord">
+          <ac:chgData name="Weifeng Xu" userId="e7aed605-a3dd-4d5a-a692-a87037af107b" providerId="ADAL" clId="{DD1FDF10-7D46-46BB-AFF8-9771F1571229}" dt="2023-03-16T03:00:38.676" v="782" actId="26606"/>
+          <ac:spMkLst>
+            <pc:docMk/>
+            <pc:sldMk cId="3350146509" sldId="543"/>
+            <ac:spMk id="2" creationId="{72509EB9-51CC-2DC5-4B50-E225C35AC752}"/>
+          </ac:spMkLst>
+        </pc:spChg>
+        <pc:spChg chg="del">
+          <ac:chgData name="Weifeng Xu" userId="e7aed605-a3dd-4d5a-a692-a87037af107b" providerId="ADAL" clId="{DD1FDF10-7D46-46BB-AFF8-9771F1571229}" dt="2023-03-16T03:00:36.050" v="780" actId="700"/>
+          <ac:spMkLst>
+            <pc:docMk/>
+            <pc:sldMk cId="3350146509" sldId="543"/>
+            <ac:spMk id="3" creationId="{CD292543-61A0-74D8-0229-4CAC5CAC5A76}"/>
+          </ac:spMkLst>
+        </pc:spChg>
+        <pc:spChg chg="add del">
+          <ac:chgData name="Weifeng Xu" userId="e7aed605-a3dd-4d5a-a692-a87037af107b" providerId="ADAL" clId="{DD1FDF10-7D46-46BB-AFF8-9771F1571229}" dt="2023-03-16T03:00:38.676" v="782" actId="26606"/>
+          <ac:spMkLst>
+            <pc:docMk/>
+            <pc:sldMk cId="3350146509" sldId="543"/>
+            <ac:spMk id="8" creationId="{06DA9DF9-31F7-4056-B42E-878CC92417B8}"/>
+          </ac:spMkLst>
+        </pc:spChg>
+        <pc:picChg chg="add del">
+          <ac:chgData name="Weifeng Xu" userId="e7aed605-a3dd-4d5a-a692-a87037af107b" providerId="ADAL" clId="{DD1FDF10-7D46-46BB-AFF8-9771F1571229}" dt="2023-03-16T03:00:38.676" v="782" actId="26606"/>
+          <ac:picMkLst>
+            <pc:docMk/>
+            <pc:sldMk cId="3350146509" sldId="543"/>
+            <ac:picMk id="4" creationId="{C2C281F1-00BE-1371-C067-9A7CD55ABEB1}"/>
+          </ac:picMkLst>
+        </pc:picChg>
+        <pc:picChg chg="add">
+          <ac:chgData name="Weifeng Xu" userId="e7aed605-a3dd-4d5a-a692-a87037af107b" providerId="ADAL" clId="{DD1FDF10-7D46-46BB-AFF8-9771F1571229}" dt="2023-03-16T03:06:54.043" v="783" actId="22"/>
+          <ac:picMkLst>
+            <pc:docMk/>
+            <pc:sldMk cId="3350146509" sldId="543"/>
+            <ac:picMk id="6" creationId="{74E62257-DC7A-D4F8-63EA-272BA93A89C7}"/>
+          </ac:picMkLst>
+        </pc:picChg>
+      </pc:sldChg>
+      <pc:sldChg chg="addSp modSp new mod modClrScheme chgLayout">
+        <pc:chgData name="Weifeng Xu" userId="e7aed605-a3dd-4d5a-a692-a87037af107b" providerId="ADAL" clId="{DD1FDF10-7D46-46BB-AFF8-9771F1571229}" dt="2023-03-16T03:14:21.303" v="878" actId="13822"/>
+        <pc:sldMkLst>
+          <pc:docMk/>
+          <pc:sldMk cId="4084968296" sldId="544"/>
+        </pc:sldMkLst>
+        <pc:spChg chg="add mod">
+          <ac:chgData name="Weifeng Xu" userId="e7aed605-a3dd-4d5a-a692-a87037af107b" providerId="ADAL" clId="{DD1FDF10-7D46-46BB-AFF8-9771F1571229}" dt="2023-03-16T03:08:52.966" v="811" actId="20577"/>
+          <ac:spMkLst>
+            <pc:docMk/>
+            <pc:sldMk cId="4084968296" sldId="544"/>
+            <ac:spMk id="2" creationId="{FAE9740A-8E38-9626-4B7C-508CEF5D8528}"/>
+          </ac:spMkLst>
+        </pc:spChg>
+        <pc:spChg chg="add mod">
+          <ac:chgData name="Weifeng Xu" userId="e7aed605-a3dd-4d5a-a692-a87037af107b" providerId="ADAL" clId="{DD1FDF10-7D46-46BB-AFF8-9771F1571229}" dt="2023-03-16T03:14:09.456" v="876" actId="20577"/>
+          <ac:spMkLst>
+            <pc:docMk/>
+            <pc:sldMk cId="4084968296" sldId="544"/>
+            <ac:spMk id="5" creationId="{4FF478C2-F4C0-E605-07D9-1C8BF192B7C5}"/>
+          </ac:spMkLst>
+        </pc:spChg>
+        <pc:picChg chg="add mod">
+          <ac:chgData name="Weifeng Xu" userId="e7aed605-a3dd-4d5a-a692-a87037af107b" providerId="ADAL" clId="{DD1FDF10-7D46-46BB-AFF8-9771F1571229}" dt="2023-03-16T03:12:27.148" v="815" actId="1076"/>
+          <ac:picMkLst>
+            <pc:docMk/>
+            <pc:sldMk cId="4084968296" sldId="544"/>
+            <ac:picMk id="4" creationId="{AF7FA49B-3C39-0E48-BA5B-73D231CD6540}"/>
+          </ac:picMkLst>
+        </pc:picChg>
+        <pc:cxnChg chg="add mod">
+          <ac:chgData name="Weifeng Xu" userId="e7aed605-a3dd-4d5a-a692-a87037af107b" providerId="ADAL" clId="{DD1FDF10-7D46-46BB-AFF8-9771F1571229}" dt="2023-03-16T03:14:21.303" v="878" actId="13822"/>
+          <ac:cxnSpMkLst>
+            <pc:docMk/>
+            <pc:sldMk cId="4084968296" sldId="544"/>
+            <ac:cxnSpMk id="7" creationId="{2796A31A-AAC1-B99D-04D6-5061B115724E}"/>
+          </ac:cxnSpMkLst>
+        </pc:cxnChg>
+      </pc:sldChg>
+      <pc:sldChg chg="addSp delSp modSp new mod modClrScheme chgLayout">
+        <pc:chgData name="Weifeng Xu" userId="e7aed605-a3dd-4d5a-a692-a87037af107b" providerId="ADAL" clId="{DD1FDF10-7D46-46BB-AFF8-9771F1571229}" dt="2023-03-16T03:20:31.896" v="884" actId="1076"/>
+        <pc:sldMkLst>
+          <pc:docMk/>
+          <pc:sldMk cId="591421108" sldId="545"/>
+        </pc:sldMkLst>
+        <pc:spChg chg="del">
+          <ac:chgData name="Weifeng Xu" userId="e7aed605-a3dd-4d5a-a692-a87037af107b" providerId="ADAL" clId="{DD1FDF10-7D46-46BB-AFF8-9771F1571229}" dt="2023-03-16T03:20:27.494" v="881" actId="700"/>
+          <ac:spMkLst>
+            <pc:docMk/>
+            <pc:sldMk cId="591421108" sldId="545"/>
+            <ac:spMk id="2" creationId="{7C2DE80F-AEB8-0838-25FA-41C55EFAA6DC}"/>
+          </ac:spMkLst>
+        </pc:spChg>
+        <pc:picChg chg="add mod">
+          <ac:chgData name="Weifeng Xu" userId="e7aed605-a3dd-4d5a-a692-a87037af107b" providerId="ADAL" clId="{DD1FDF10-7D46-46BB-AFF8-9771F1571229}" dt="2023-03-16T03:20:31.896" v="884" actId="1076"/>
+          <ac:picMkLst>
+            <pc:docMk/>
+            <pc:sldMk cId="591421108" sldId="545"/>
+            <ac:picMk id="4" creationId="{8E5AA69B-E8E6-0A13-7249-902691BFA64C}"/>
+          </ac:picMkLst>
+        </pc:picChg>
+      </pc:sldChg>
+      <pc:sldChg chg="addSp modSp new mod">
+        <pc:chgData name="Weifeng Xu" userId="e7aed605-a3dd-4d5a-a692-a87037af107b" providerId="ADAL" clId="{DD1FDF10-7D46-46BB-AFF8-9771F1571229}" dt="2023-03-16T03:22:18.255" v="889" actId="1076"/>
+        <pc:sldMkLst>
+          <pc:docMk/>
+          <pc:sldMk cId="3761317368" sldId="546"/>
+        </pc:sldMkLst>
+        <pc:picChg chg="add mod">
+          <ac:chgData name="Weifeng Xu" userId="e7aed605-a3dd-4d5a-a692-a87037af107b" providerId="ADAL" clId="{DD1FDF10-7D46-46BB-AFF8-9771F1571229}" dt="2023-03-16T03:22:18.255" v="889" actId="1076"/>
+          <ac:picMkLst>
+            <pc:docMk/>
+            <pc:sldMk cId="3761317368" sldId="546"/>
+            <ac:picMk id="3" creationId="{EDF95C69-3BFB-5E14-5875-FA5044DF6F4F}"/>
+          </ac:picMkLst>
+        </pc:picChg>
       </pc:sldChg>
     </pc:docChg>
   </pc:docChgLst>
@@ -10328,6 +10632,200 @@
           <a:lstStyle/>
           <a:p>
             <a:r>
+              <a:rPr lang="en-US" dirty="0"/>
+              <a:t>https://raw.githubusercontent.com/frankwxu/digital-forensics-lab/main/Networking_Forensics/lab_files/dns_spoof/index.html</a:t>
+            </a:r>
+          </a:p>
+        </p:txBody>
+      </p:sp>
+      <p:sp>
+        <p:nvSpPr>
+          <p:cNvPr id="4" name="Slide Number Placeholder 3"/>
+          <p:cNvSpPr>
+            <a:spLocks noGrp="1"/>
+          </p:cNvSpPr>
+          <p:nvPr>
+            <p:ph type="sldNum" sz="quarter" idx="5"/>
+          </p:nvPr>
+        </p:nvSpPr>
+        <p:spPr/>
+        <p:txBody>
+          <a:bodyPr/>
+          <a:lstStyle/>
+          <a:p>
+            <a:fld id="{DDBF98C7-164A-4723-84F0-B1E4B080DDEC}" type="slidenum">
+              <a:rPr lang="en-US" smtClean="0"/>
+              <a:t>5</a:t>
+            </a:fld>
+            <a:endParaRPr lang="en-US"/>
+          </a:p>
+        </p:txBody>
+      </p:sp>
+    </p:spTree>
+    <p:extLst>
+      <p:ext uri="{BB962C8B-B14F-4D97-AF65-F5344CB8AC3E}">
+        <p14:creationId xmlns:p14="http://schemas.microsoft.com/office/powerpoint/2010/main" val="1304573083"/>
+      </p:ext>
+    </p:extLst>
+  </p:cSld>
+  <p:clrMapOvr>
+    <a:masterClrMapping/>
+  </p:clrMapOvr>
+</p:notes>
+</file>
+
+<file path=ppt/notesSlides/notesSlide3.xml><?xml version="1.0" encoding="utf-8"?>
+<p:notes xmlns:a="http://schemas.openxmlformats.org/drawingml/2006/main" xmlns:r="http://schemas.openxmlformats.org/officeDocument/2006/relationships" xmlns:p="http://schemas.openxmlformats.org/presentationml/2006/main">
+  <p:cSld>
+    <p:spTree>
+      <p:nvGrpSpPr>
+        <p:cNvPr id="1" name=""/>
+        <p:cNvGrpSpPr/>
+        <p:nvPr/>
+      </p:nvGrpSpPr>
+      <p:grpSpPr>
+        <a:xfrm>
+          <a:off x="0" y="0"/>
+          <a:ext cx="0" cy="0"/>
+          <a:chOff x="0" y="0"/>
+          <a:chExt cx="0" cy="0"/>
+        </a:xfrm>
+      </p:grpSpPr>
+      <p:sp>
+        <p:nvSpPr>
+          <p:cNvPr id="2" name="Slide Image Placeholder 1"/>
+          <p:cNvSpPr>
+            <a:spLocks noGrp="1" noRot="1" noChangeAspect="1"/>
+          </p:cNvSpPr>
+          <p:nvPr>
+            <p:ph type="sldImg"/>
+          </p:nvPr>
+        </p:nvSpPr>
+        <p:spPr/>
+      </p:sp>
+      <p:sp>
+        <p:nvSpPr>
+          <p:cNvPr id="3" name="Notes Placeholder 2"/>
+          <p:cNvSpPr>
+            <a:spLocks noGrp="1"/>
+          </p:cNvSpPr>
+          <p:nvPr>
+            <p:ph type="body" idx="1"/>
+          </p:nvPr>
+        </p:nvSpPr>
+        <p:spPr/>
+        <p:txBody>
+          <a:bodyPr/>
+          <a:lstStyle/>
+          <a:p>
+            <a:r>
+              <a:rPr lang="fr-FR" dirty="0" err="1"/>
+              <a:t>wget</a:t>
+            </a:r>
+            <a:r>
+              <a:rPr lang="fr-FR" dirty="0"/>
+              <a:t> -q https://raw.githubusercontent.com/frankwxu/digital-forensics-lab/main/Networking_Forensics/lab_files/dns_spoof/arp.py</a:t>
+            </a:r>
+          </a:p>
+          <a:p>
+            <a:r>
+              <a:rPr lang="fr-FR" dirty="0" err="1"/>
+              <a:t>wget</a:t>
+            </a:r>
+            <a:r>
+              <a:rPr lang="fr-FR" dirty="0"/>
+              <a:t> -q https://raw.githubusercontent.com/frankwxu/digital-forensics-lab/main/Networking_Forensics/lab_files/dns_spoof/dns_spoof.py</a:t>
+            </a:r>
+          </a:p>
+          <a:p>
+            <a:endParaRPr lang="fr-FR" dirty="0"/>
+          </a:p>
+          <a:p>
+            <a:endParaRPr lang="en-US" dirty="0"/>
+          </a:p>
+        </p:txBody>
+      </p:sp>
+      <p:sp>
+        <p:nvSpPr>
+          <p:cNvPr id="4" name="Slide Number Placeholder 3"/>
+          <p:cNvSpPr>
+            <a:spLocks noGrp="1"/>
+          </p:cNvSpPr>
+          <p:nvPr>
+            <p:ph type="sldNum" sz="quarter" idx="5"/>
+          </p:nvPr>
+        </p:nvSpPr>
+        <p:spPr/>
+        <p:txBody>
+          <a:bodyPr/>
+          <a:lstStyle/>
+          <a:p>
+            <a:fld id="{DDBF98C7-164A-4723-84F0-B1E4B080DDEC}" type="slidenum">
+              <a:rPr lang="en-US" smtClean="0"/>
+              <a:t>8</a:t>
+            </a:fld>
+            <a:endParaRPr lang="en-US"/>
+          </a:p>
+        </p:txBody>
+      </p:sp>
+    </p:spTree>
+    <p:extLst>
+      <p:ext uri="{BB962C8B-B14F-4D97-AF65-F5344CB8AC3E}">
+        <p14:creationId xmlns:p14="http://schemas.microsoft.com/office/powerpoint/2010/main" val="1283435442"/>
+      </p:ext>
+    </p:extLst>
+  </p:cSld>
+  <p:clrMapOvr>
+    <a:masterClrMapping/>
+  </p:clrMapOvr>
+</p:notes>
+</file>
+
+<file path=ppt/notesSlides/notesSlide4.xml><?xml version="1.0" encoding="utf-8"?>
+<p:notes xmlns:a="http://schemas.openxmlformats.org/drawingml/2006/main" xmlns:r="http://schemas.openxmlformats.org/officeDocument/2006/relationships" xmlns:p="http://schemas.openxmlformats.org/presentationml/2006/main">
+  <p:cSld>
+    <p:spTree>
+      <p:nvGrpSpPr>
+        <p:cNvPr id="1" name=""/>
+        <p:cNvGrpSpPr/>
+        <p:nvPr/>
+      </p:nvGrpSpPr>
+      <p:grpSpPr>
+        <a:xfrm>
+          <a:off x="0" y="0"/>
+          <a:ext cx="0" cy="0"/>
+          <a:chOff x="0" y="0"/>
+          <a:chExt cx="0" cy="0"/>
+        </a:xfrm>
+      </p:grpSpPr>
+      <p:sp>
+        <p:nvSpPr>
+          <p:cNvPr id="2" name="Slide Image Placeholder 1"/>
+          <p:cNvSpPr>
+            <a:spLocks noGrp="1" noRot="1" noChangeAspect="1"/>
+          </p:cNvSpPr>
+          <p:nvPr>
+            <p:ph type="sldImg"/>
+          </p:nvPr>
+        </p:nvSpPr>
+        <p:spPr/>
+      </p:sp>
+      <p:sp>
+        <p:nvSpPr>
+          <p:cNvPr id="3" name="Notes Placeholder 2"/>
+          <p:cNvSpPr>
+            <a:spLocks noGrp="1"/>
+          </p:cNvSpPr>
+          <p:nvPr>
+            <p:ph type="body" idx="1"/>
+          </p:nvPr>
+        </p:nvSpPr>
+        <p:spPr/>
+        <p:txBody>
+          <a:bodyPr/>
+          <a:lstStyle/>
+          <a:p>
+            <a:r>
               <a:rPr lang="en-US" dirty="0" err="1"/>
               <a:t>sudo</a:t>
             </a:r>
@@ -10365,7 +10863,7 @@
           <a:p>
             <a:fld id="{DDBF98C7-164A-4723-84F0-B1E4B080DDEC}" type="slidenum">
               <a:rPr lang="en-US" smtClean="0"/>
-              <a:t>5</a:t>
+              <a:t>9</a:t>
             </a:fld>
             <a:endParaRPr lang="en-US"/>
           </a:p>
@@ -13459,7 +13957,618 @@
 </p:sld>
 </file>
 
+<file path=ppt/slides/slide10.xml><?xml version="1.0" encoding="utf-8"?>
+<p:sld xmlns:a="http://schemas.openxmlformats.org/drawingml/2006/main" xmlns:r="http://schemas.openxmlformats.org/officeDocument/2006/relationships" xmlns:p="http://schemas.openxmlformats.org/presentationml/2006/main">
+  <p:cSld>
+    <p:spTree>
+      <p:nvGrpSpPr>
+        <p:cNvPr id="1" name=""/>
+        <p:cNvGrpSpPr/>
+        <p:nvPr/>
+      </p:nvGrpSpPr>
+      <p:grpSpPr>
+        <a:xfrm>
+          <a:off x="0" y="0"/>
+          <a:ext cx="0" cy="0"/>
+          <a:chOff x="0" y="0"/>
+          <a:chExt cx="0" cy="0"/>
+        </a:xfrm>
+      </p:grpSpPr>
+      <p:pic>
+        <p:nvPicPr>
+          <p:cNvPr id="3" name="Picture 2">
+            <a:extLst>
+              <a:ext uri="{FF2B5EF4-FFF2-40B4-BE49-F238E27FC236}">
+                <a16:creationId xmlns:a16="http://schemas.microsoft.com/office/drawing/2014/main" id="{C3478EC3-E481-6FC5-F4A6-0BB9849BFA65}"/>
+              </a:ext>
+            </a:extLst>
+          </p:cNvPr>
+          <p:cNvPicPr>
+            <a:picLocks noChangeAspect="1"/>
+          </p:cNvPicPr>
+          <p:nvPr/>
+        </p:nvPicPr>
+        <p:blipFill>
+          <a:blip r:embed="rId2"/>
+          <a:stretch>
+            <a:fillRect/>
+          </a:stretch>
+        </p:blipFill>
+        <p:spPr>
+          <a:xfrm>
+            <a:off x="2624789" y="940933"/>
+            <a:ext cx="5578323" cy="3147333"/>
+          </a:xfrm>
+          <a:prstGeom prst="rect">
+            <a:avLst/>
+          </a:prstGeom>
+        </p:spPr>
+      </p:pic>
+      <p:pic>
+        <p:nvPicPr>
+          <p:cNvPr id="5" name="Picture 4">
+            <a:extLst>
+              <a:ext uri="{FF2B5EF4-FFF2-40B4-BE49-F238E27FC236}">
+                <a16:creationId xmlns:a16="http://schemas.microsoft.com/office/drawing/2014/main" id="{8B97AD07-B226-E2E5-E076-531CF5DAAE61}"/>
+              </a:ext>
+            </a:extLst>
+          </p:cNvPr>
+          <p:cNvPicPr>
+            <a:picLocks noChangeAspect="1"/>
+          </p:cNvPicPr>
+          <p:nvPr/>
+        </p:nvPicPr>
+        <p:blipFill>
+          <a:blip r:embed="rId3"/>
+          <a:stretch>
+            <a:fillRect/>
+          </a:stretch>
+        </p:blipFill>
+        <p:spPr>
+          <a:xfrm>
+            <a:off x="2624789" y="4497508"/>
+            <a:ext cx="6942422" cy="1950889"/>
+          </a:xfrm>
+          <a:prstGeom prst="rect">
+            <a:avLst/>
+          </a:prstGeom>
+        </p:spPr>
+      </p:pic>
+      <p:pic>
+        <p:nvPicPr>
+          <p:cNvPr id="7" name="Picture 6">
+            <a:extLst>
+              <a:ext uri="{FF2B5EF4-FFF2-40B4-BE49-F238E27FC236}">
+                <a16:creationId xmlns:a16="http://schemas.microsoft.com/office/drawing/2014/main" id="{D42E6D75-3AAF-B1C7-79E1-67AC7403B6BC}"/>
+              </a:ext>
+            </a:extLst>
+          </p:cNvPr>
+          <p:cNvPicPr>
+            <a:picLocks noChangeAspect="1"/>
+          </p:cNvPicPr>
+          <p:nvPr/>
+        </p:nvPicPr>
+        <p:blipFill>
+          <a:blip r:embed="rId4"/>
+          <a:stretch>
+            <a:fillRect/>
+          </a:stretch>
+        </p:blipFill>
+        <p:spPr>
+          <a:xfrm>
+            <a:off x="8896902" y="1752533"/>
+            <a:ext cx="2789162" cy="1524132"/>
+          </a:xfrm>
+          <a:prstGeom prst="rect">
+            <a:avLst/>
+          </a:prstGeom>
+        </p:spPr>
+      </p:pic>
+      <p:cxnSp>
+        <p:nvCxnSpPr>
+          <p:cNvPr id="9" name="Straight Arrow Connector 8">
+            <a:extLst>
+              <a:ext uri="{FF2B5EF4-FFF2-40B4-BE49-F238E27FC236}">
+                <a16:creationId xmlns:a16="http://schemas.microsoft.com/office/drawing/2014/main" id="{95BA2671-98E3-7665-8399-0BFE1BC47E22}"/>
+              </a:ext>
+            </a:extLst>
+          </p:cNvPr>
+          <p:cNvCxnSpPr>
+            <a:stCxn id="7" idx="1"/>
+          </p:cNvCxnSpPr>
+          <p:nvPr/>
+        </p:nvCxnSpPr>
+        <p:spPr>
+          <a:xfrm flipH="1" flipV="1">
+            <a:off x="8203112" y="2061882"/>
+            <a:ext cx="693790" cy="452717"/>
+          </a:xfrm>
+          <a:prstGeom prst="straightConnector1">
+            <a:avLst/>
+          </a:prstGeom>
+          <a:ln>
+            <a:tailEnd type="triangle"/>
+          </a:ln>
+        </p:spPr>
+        <p:style>
+          <a:lnRef idx="1">
+            <a:schemeClr val="accent2"/>
+          </a:lnRef>
+          <a:fillRef idx="0">
+            <a:schemeClr val="accent2"/>
+          </a:fillRef>
+          <a:effectRef idx="0">
+            <a:schemeClr val="accent2"/>
+          </a:effectRef>
+          <a:fontRef idx="minor">
+            <a:schemeClr val="tx1"/>
+          </a:fontRef>
+        </p:style>
+      </p:cxnSp>
+    </p:spTree>
+    <p:extLst>
+      <p:ext uri="{BB962C8B-B14F-4D97-AF65-F5344CB8AC3E}">
+        <p14:creationId xmlns:p14="http://schemas.microsoft.com/office/powerpoint/2010/main" val="3797123336"/>
+      </p:ext>
+    </p:extLst>
+  </p:cSld>
+  <p:clrMapOvr>
+    <a:masterClrMapping/>
+  </p:clrMapOvr>
+</p:sld>
+</file>
+
+<file path=ppt/slides/slide11.xml><?xml version="1.0" encoding="utf-8"?>
+<p:sld xmlns:a="http://schemas.openxmlformats.org/drawingml/2006/main" xmlns:r="http://schemas.openxmlformats.org/officeDocument/2006/relationships" xmlns:p="http://schemas.openxmlformats.org/presentationml/2006/main">
+  <p:cSld>
+    <p:spTree>
+      <p:nvGrpSpPr>
+        <p:cNvPr id="1" name=""/>
+        <p:cNvGrpSpPr/>
+        <p:nvPr/>
+      </p:nvGrpSpPr>
+      <p:grpSpPr>
+        <a:xfrm>
+          <a:off x="0" y="0"/>
+          <a:ext cx="0" cy="0"/>
+          <a:chOff x="0" y="0"/>
+          <a:chExt cx="0" cy="0"/>
+        </a:xfrm>
+      </p:grpSpPr>
+      <p:pic>
+        <p:nvPicPr>
+          <p:cNvPr id="3" name="Picture 2">
+            <a:extLst>
+              <a:ext uri="{FF2B5EF4-FFF2-40B4-BE49-F238E27FC236}">
+                <a16:creationId xmlns:a16="http://schemas.microsoft.com/office/drawing/2014/main" id="{57986488-3059-4494-ADDA-5F5FB07CC451}"/>
+              </a:ext>
+            </a:extLst>
+          </p:cNvPr>
+          <p:cNvPicPr>
+            <a:picLocks noChangeAspect="1"/>
+          </p:cNvPicPr>
+          <p:nvPr/>
+        </p:nvPicPr>
+        <p:blipFill>
+          <a:blip r:embed="rId2"/>
+          <a:stretch>
+            <a:fillRect/>
+          </a:stretch>
+        </p:blipFill>
+        <p:spPr>
+          <a:xfrm>
+            <a:off x="2068481" y="1032302"/>
+            <a:ext cx="8055038" cy="4793395"/>
+          </a:xfrm>
+          <a:prstGeom prst="rect">
+            <a:avLst/>
+          </a:prstGeom>
+        </p:spPr>
+      </p:pic>
+    </p:spTree>
+    <p:extLst>
+      <p:ext uri="{BB962C8B-B14F-4D97-AF65-F5344CB8AC3E}">
+        <p14:creationId xmlns:p14="http://schemas.microsoft.com/office/powerpoint/2010/main" val="186619071"/>
+      </p:ext>
+    </p:extLst>
+  </p:cSld>
+  <p:clrMapOvr>
+    <a:masterClrMapping/>
+  </p:clrMapOvr>
+</p:sld>
+</file>
+
+<file path=ppt/slides/slide12.xml><?xml version="1.0" encoding="utf-8"?>
+<p:sld xmlns:a="http://schemas.openxmlformats.org/drawingml/2006/main" xmlns:r="http://schemas.openxmlformats.org/officeDocument/2006/relationships" xmlns:p="http://schemas.openxmlformats.org/presentationml/2006/main">
+  <p:cSld>
+    <p:spTree>
+      <p:nvGrpSpPr>
+        <p:cNvPr id="1" name=""/>
+        <p:cNvGrpSpPr/>
+        <p:nvPr/>
+      </p:nvGrpSpPr>
+      <p:grpSpPr>
+        <a:xfrm>
+          <a:off x="0" y="0"/>
+          <a:ext cx="0" cy="0"/>
+          <a:chOff x="0" y="0"/>
+          <a:chExt cx="0" cy="0"/>
+        </a:xfrm>
+      </p:grpSpPr>
+      <p:sp>
+        <p:nvSpPr>
+          <p:cNvPr id="2" name="Title 1">
+            <a:extLst>
+              <a:ext uri="{FF2B5EF4-FFF2-40B4-BE49-F238E27FC236}">
+                <a16:creationId xmlns:a16="http://schemas.microsoft.com/office/drawing/2014/main" id="{FAE9740A-8E38-9626-4B7C-508CEF5D8528}"/>
+              </a:ext>
+            </a:extLst>
+          </p:cNvPr>
+          <p:cNvSpPr>
+            <a:spLocks noGrp="1"/>
+          </p:cNvSpPr>
+          <p:nvPr>
+            <p:ph type="title"/>
+          </p:nvPr>
+        </p:nvSpPr>
+        <p:spPr/>
+        <p:txBody>
+          <a:bodyPr/>
+          <a:lstStyle/>
+          <a:p>
+            <a:r>
+              <a:rPr lang="en-US" dirty="0"/>
+              <a:t>Key functions </a:t>
+            </a:r>
+          </a:p>
+        </p:txBody>
+      </p:sp>
+      <p:pic>
+        <p:nvPicPr>
+          <p:cNvPr id="4" name="Picture 3">
+            <a:extLst>
+              <a:ext uri="{FF2B5EF4-FFF2-40B4-BE49-F238E27FC236}">
+                <a16:creationId xmlns:a16="http://schemas.microsoft.com/office/drawing/2014/main" id="{AF7FA49B-3C39-0E48-BA5B-73D231CD6540}"/>
+              </a:ext>
+            </a:extLst>
+          </p:cNvPr>
+          <p:cNvPicPr>
+            <a:picLocks noChangeAspect="1"/>
+          </p:cNvPicPr>
+          <p:nvPr/>
+        </p:nvPicPr>
+        <p:blipFill>
+          <a:blip r:embed="rId2"/>
+          <a:stretch>
+            <a:fillRect/>
+          </a:stretch>
+        </p:blipFill>
+        <p:spPr>
+          <a:xfrm>
+            <a:off x="838200" y="1937421"/>
+            <a:ext cx="8577880" cy="2725605"/>
+          </a:xfrm>
+          <a:prstGeom prst="rect">
+            <a:avLst/>
+          </a:prstGeom>
+        </p:spPr>
+      </p:pic>
+      <p:sp>
+        <p:nvSpPr>
+          <p:cNvPr id="5" name="TextBox 4">
+            <a:extLst>
+              <a:ext uri="{FF2B5EF4-FFF2-40B4-BE49-F238E27FC236}">
+                <a16:creationId xmlns:a16="http://schemas.microsoft.com/office/drawing/2014/main" id="{4FF478C2-F4C0-E605-07D9-1C8BF192B7C5}"/>
+              </a:ext>
+            </a:extLst>
+          </p:cNvPr>
+          <p:cNvSpPr txBox="1"/>
+          <p:nvPr/>
+        </p:nvSpPr>
+        <p:spPr>
+          <a:xfrm>
+            <a:off x="9607603" y="2700058"/>
+            <a:ext cx="1945767" cy="646331"/>
+          </a:xfrm>
+          <a:prstGeom prst="rect">
+            <a:avLst/>
+          </a:prstGeom>
+          <a:solidFill>
+            <a:schemeClr val="accent4">
+              <a:lumMod val="20000"/>
+              <a:lumOff val="80000"/>
+            </a:schemeClr>
+          </a:solidFill>
+        </p:spPr>
+        <p:txBody>
+          <a:bodyPr wrap="square" rtlCol="0">
+            <a:spAutoFit/>
+          </a:bodyPr>
+          <a:lstStyle/>
+          <a:p>
+            <a:r>
+              <a:rPr lang="en-US" dirty="0"/>
+              <a:t>The rule triggers a callback function</a:t>
+            </a:r>
+          </a:p>
+        </p:txBody>
+      </p:sp>
+      <p:cxnSp>
+        <p:nvCxnSpPr>
+          <p:cNvPr id="7" name="Straight Arrow Connector 6">
+            <a:extLst>
+              <a:ext uri="{FF2B5EF4-FFF2-40B4-BE49-F238E27FC236}">
+                <a16:creationId xmlns:a16="http://schemas.microsoft.com/office/drawing/2014/main" id="{2796A31A-AAC1-B99D-04D6-5061B115724E}"/>
+              </a:ext>
+            </a:extLst>
+          </p:cNvPr>
+          <p:cNvCxnSpPr>
+            <a:stCxn id="5" idx="1"/>
+          </p:cNvCxnSpPr>
+          <p:nvPr/>
+        </p:nvCxnSpPr>
+        <p:spPr>
+          <a:xfrm flipH="1">
+            <a:off x="6531429" y="3023224"/>
+            <a:ext cx="3076174" cy="68319"/>
+          </a:xfrm>
+          <a:prstGeom prst="straightConnector1">
+            <a:avLst/>
+          </a:prstGeom>
+          <a:ln>
+            <a:tailEnd type="triangle"/>
+          </a:ln>
+        </p:spPr>
+        <p:style>
+          <a:lnRef idx="1">
+            <a:schemeClr val="accent2"/>
+          </a:lnRef>
+          <a:fillRef idx="0">
+            <a:schemeClr val="accent2"/>
+          </a:fillRef>
+          <a:effectRef idx="0">
+            <a:schemeClr val="accent2"/>
+          </a:effectRef>
+          <a:fontRef idx="minor">
+            <a:schemeClr val="tx1"/>
+          </a:fontRef>
+        </p:style>
+      </p:cxnSp>
+    </p:spTree>
+    <p:extLst>
+      <p:ext uri="{BB962C8B-B14F-4D97-AF65-F5344CB8AC3E}">
+        <p14:creationId xmlns:p14="http://schemas.microsoft.com/office/powerpoint/2010/main" val="4084968296"/>
+      </p:ext>
+    </p:extLst>
+  </p:cSld>
+  <p:clrMapOvr>
+    <a:masterClrMapping/>
+  </p:clrMapOvr>
+</p:sld>
+</file>
+
+<file path=ppt/slides/slide13.xml><?xml version="1.0" encoding="utf-8"?>
+<p:sld xmlns:a="http://schemas.openxmlformats.org/drawingml/2006/main" xmlns:r="http://schemas.openxmlformats.org/officeDocument/2006/relationships" xmlns:p="http://schemas.openxmlformats.org/presentationml/2006/main">
+  <p:cSld>
+    <p:spTree>
+      <p:nvGrpSpPr>
+        <p:cNvPr id="1" name=""/>
+        <p:cNvGrpSpPr/>
+        <p:nvPr/>
+      </p:nvGrpSpPr>
+      <p:grpSpPr>
+        <a:xfrm>
+          <a:off x="0" y="0"/>
+          <a:ext cx="0" cy="0"/>
+          <a:chOff x="0" y="0"/>
+          <a:chExt cx="0" cy="0"/>
+        </a:xfrm>
+      </p:grpSpPr>
+      <p:pic>
+        <p:nvPicPr>
+          <p:cNvPr id="4" name="Picture 3">
+            <a:extLst>
+              <a:ext uri="{FF2B5EF4-FFF2-40B4-BE49-F238E27FC236}">
+                <a16:creationId xmlns:a16="http://schemas.microsoft.com/office/drawing/2014/main" id="{8E5AA69B-E8E6-0A13-7249-902691BFA64C}"/>
+              </a:ext>
+            </a:extLst>
+          </p:cNvPr>
+          <p:cNvPicPr>
+            <a:picLocks noChangeAspect="1"/>
+          </p:cNvPicPr>
+          <p:nvPr/>
+        </p:nvPicPr>
+        <p:blipFill>
+          <a:blip r:embed="rId2"/>
+          <a:stretch>
+            <a:fillRect/>
+          </a:stretch>
+        </p:blipFill>
+        <p:spPr>
+          <a:xfrm>
+            <a:off x="1728762" y="826766"/>
+            <a:ext cx="7484454" cy="5582998"/>
+          </a:xfrm>
+          <a:prstGeom prst="rect">
+            <a:avLst/>
+          </a:prstGeom>
+        </p:spPr>
+      </p:pic>
+    </p:spTree>
+    <p:extLst>
+      <p:ext uri="{BB962C8B-B14F-4D97-AF65-F5344CB8AC3E}">
+        <p14:creationId xmlns:p14="http://schemas.microsoft.com/office/powerpoint/2010/main" val="591421108"/>
+      </p:ext>
+    </p:extLst>
+  </p:cSld>
+  <p:clrMapOvr>
+    <a:masterClrMapping/>
+  </p:clrMapOvr>
+</p:sld>
+</file>
+
+<file path=ppt/slides/slide14.xml><?xml version="1.0" encoding="utf-8"?>
+<p:sld xmlns:a="http://schemas.openxmlformats.org/drawingml/2006/main" xmlns:r="http://schemas.openxmlformats.org/officeDocument/2006/relationships" xmlns:p="http://schemas.openxmlformats.org/presentationml/2006/main">
+  <p:cSld>
+    <p:spTree>
+      <p:nvGrpSpPr>
+        <p:cNvPr id="1" name=""/>
+        <p:cNvGrpSpPr/>
+        <p:nvPr/>
+      </p:nvGrpSpPr>
+      <p:grpSpPr>
+        <a:xfrm>
+          <a:off x="0" y="0"/>
+          <a:ext cx="0" cy="0"/>
+          <a:chOff x="0" y="0"/>
+          <a:chExt cx="0" cy="0"/>
+        </a:xfrm>
+      </p:grpSpPr>
+      <p:pic>
+        <p:nvPicPr>
+          <p:cNvPr id="3" name="Picture 2">
+            <a:extLst>
+              <a:ext uri="{FF2B5EF4-FFF2-40B4-BE49-F238E27FC236}">
+                <a16:creationId xmlns:a16="http://schemas.microsoft.com/office/drawing/2014/main" id="{EDF95C69-3BFB-5E14-5875-FA5044DF6F4F}"/>
+              </a:ext>
+            </a:extLst>
+          </p:cNvPr>
+          <p:cNvPicPr>
+            <a:picLocks noChangeAspect="1"/>
+          </p:cNvPicPr>
+          <p:nvPr/>
+        </p:nvPicPr>
+        <p:blipFill>
+          <a:blip r:embed="rId2"/>
+          <a:stretch>
+            <a:fillRect/>
+          </a:stretch>
+        </p:blipFill>
+        <p:spPr>
+          <a:xfrm>
+            <a:off x="2188494" y="1071793"/>
+            <a:ext cx="6946542" cy="4714413"/>
+          </a:xfrm>
+          <a:prstGeom prst="rect">
+            <a:avLst/>
+          </a:prstGeom>
+        </p:spPr>
+      </p:pic>
+    </p:spTree>
+    <p:extLst>
+      <p:ext uri="{BB962C8B-B14F-4D97-AF65-F5344CB8AC3E}">
+        <p14:creationId xmlns:p14="http://schemas.microsoft.com/office/powerpoint/2010/main" val="3761317368"/>
+      </p:ext>
+    </p:extLst>
+  </p:cSld>
+  <p:clrMapOvr>
+    <a:masterClrMapping/>
+  </p:clrMapOvr>
+</p:sld>
+</file>
+
 <file path=ppt/slides/slide2.xml><?xml version="1.0" encoding="utf-8"?>
+<p:sld xmlns:a="http://schemas.openxmlformats.org/drawingml/2006/main" xmlns:r="http://schemas.openxmlformats.org/officeDocument/2006/relationships" xmlns:p="http://schemas.openxmlformats.org/presentationml/2006/main">
+  <p:cSld>
+    <p:spTree>
+      <p:nvGrpSpPr>
+        <p:cNvPr id="1" name=""/>
+        <p:cNvGrpSpPr/>
+        <p:nvPr/>
+      </p:nvGrpSpPr>
+      <p:grpSpPr>
+        <a:xfrm>
+          <a:off x="0" y="0"/>
+          <a:ext cx="0" cy="0"/>
+          <a:chOff x="0" y="0"/>
+          <a:chExt cx="0" cy="0"/>
+        </a:xfrm>
+      </p:grpSpPr>
+      <p:sp>
+        <p:nvSpPr>
+          <p:cNvPr id="2" name="Title 1">
+            <a:extLst>
+              <a:ext uri="{FF2B5EF4-FFF2-40B4-BE49-F238E27FC236}">
+                <a16:creationId xmlns:a16="http://schemas.microsoft.com/office/drawing/2014/main" id="{C1A452AF-C3DC-B666-CC29-6495F232FE83}"/>
+              </a:ext>
+            </a:extLst>
+          </p:cNvPr>
+          <p:cNvSpPr>
+            <a:spLocks noGrp="1"/>
+          </p:cNvSpPr>
+          <p:nvPr>
+            <p:ph type="title"/>
+          </p:nvPr>
+        </p:nvSpPr>
+        <p:spPr/>
+        <p:txBody>
+          <a:bodyPr/>
+          <a:lstStyle/>
+          <a:p>
+            <a:r>
+              <a:rPr lang="en-US" dirty="0"/>
+              <a:t>Goal</a:t>
+            </a:r>
+          </a:p>
+        </p:txBody>
+      </p:sp>
+      <p:sp>
+        <p:nvSpPr>
+          <p:cNvPr id="3" name="Content Placeholder 2">
+            <a:extLst>
+              <a:ext uri="{FF2B5EF4-FFF2-40B4-BE49-F238E27FC236}">
+                <a16:creationId xmlns:a16="http://schemas.microsoft.com/office/drawing/2014/main" id="{D5F630AB-CF76-2187-0ADB-0D662FC201D8}"/>
+              </a:ext>
+            </a:extLst>
+          </p:cNvPr>
+          <p:cNvSpPr>
+            <a:spLocks noGrp="1"/>
+          </p:cNvSpPr>
+          <p:nvPr>
+            <p:ph idx="1"/>
+          </p:nvPr>
+        </p:nvSpPr>
+        <p:spPr/>
+        <p:txBody>
+          <a:bodyPr/>
+          <a:lstStyle/>
+          <a:p>
+            <a:r>
+              <a:rPr lang="en-US" dirty="0"/>
+              <a:t>Create a fake bank login page</a:t>
+            </a:r>
+          </a:p>
+          <a:p>
+            <a:r>
+              <a:rPr lang="en-US" dirty="0"/>
+              <a:t>Redirect users to the fake page if a user types an incorrect URL address</a:t>
+            </a:r>
+          </a:p>
+          <a:p>
+            <a:r>
+              <a:rPr lang="en-US" dirty="0"/>
+              <a:t>The user must in the same LAN</a:t>
+            </a:r>
+          </a:p>
+          <a:p>
+            <a:endParaRPr lang="en-US" dirty="0"/>
+          </a:p>
+        </p:txBody>
+      </p:sp>
+    </p:spTree>
+    <p:extLst>
+      <p:ext uri="{BB962C8B-B14F-4D97-AF65-F5344CB8AC3E}">
+        <p14:creationId xmlns:p14="http://schemas.microsoft.com/office/powerpoint/2010/main" val="1108051047"/>
+      </p:ext>
+    </p:extLst>
+  </p:cSld>
+  <p:clrMapOvr>
+    <a:masterClrMapping/>
+  </p:clrMapOvr>
+</p:sld>
+</file>
+
+<file path=ppt/slides/slide3.xml><?xml version="1.0" encoding="utf-8"?>
 <p:sld xmlns:a="http://schemas.openxmlformats.org/drawingml/2006/main" xmlns:r="http://schemas.openxmlformats.org/officeDocument/2006/relationships" xmlns:p="http://schemas.openxmlformats.org/presentationml/2006/main">
   <p:cSld>
     <p:spTree>
@@ -13499,7 +14608,7 @@
           <a:p>
             <a:r>
               <a:rPr lang="en-US" dirty="0"/>
-              <a:t>DNS Spoofing Attack</a:t>
+              <a:t>What is DNS Spoofing Attack</a:t>
             </a:r>
           </a:p>
         </p:txBody>
@@ -13542,7 +14651,7 @@
 </p:sld>
 </file>
 
-<file path=ppt/slides/slide3.xml><?xml version="1.0" encoding="utf-8"?>
+<file path=ppt/slides/slide4.xml><?xml version="1.0" encoding="utf-8"?>
 <p:sld xmlns:a="http://schemas.openxmlformats.org/drawingml/2006/main" xmlns:r="http://schemas.openxmlformats.org/officeDocument/2006/relationships" xmlns:p="http://schemas.openxmlformats.org/presentationml/2006/main">
   <p:cSld>
     <p:spTree>
@@ -14209,7 +15318,7 @@
 </p:sld>
 </file>
 
-<file path=ppt/slides/slide4.xml><?xml version="1.0" encoding="utf-8"?>
+<file path=ppt/slides/slide5.xml><?xml version="1.0" encoding="utf-8"?>
 <p:sld xmlns:a="http://schemas.openxmlformats.org/drawingml/2006/main" xmlns:r="http://schemas.openxmlformats.org/officeDocument/2006/relationships" xmlns:p="http://schemas.openxmlformats.org/presentationml/2006/main">
   <p:cSld>
     <p:spTree>
@@ -14241,14 +15350,14 @@
           <p:nvPr/>
         </p:nvPicPr>
         <p:blipFill>
-          <a:blip r:embed="rId2"/>
+          <a:blip r:embed="rId3"/>
           <a:stretch>
             <a:fillRect/>
           </a:stretch>
         </p:blipFill>
         <p:spPr>
           <a:xfrm>
-            <a:off x="973744" y="1965768"/>
+            <a:off x="973744" y="2095384"/>
             <a:ext cx="3330229" cy="1333616"/>
           </a:xfrm>
           <a:prstGeom prst="rect">
@@ -14271,14 +15380,14 @@
           <p:nvPr/>
         </p:nvPicPr>
         <p:blipFill>
-          <a:blip r:embed="rId3"/>
+          <a:blip r:embed="rId4"/>
           <a:stretch>
             <a:fillRect/>
           </a:stretch>
         </p:blipFill>
         <p:spPr>
           <a:xfrm>
-            <a:off x="838200" y="4383368"/>
+            <a:off x="973744" y="4899519"/>
             <a:ext cx="8215072" cy="1707028"/>
           </a:xfrm>
           <a:prstGeom prst="rect">
@@ -14314,6 +15423,110 @@
           </a:p>
         </p:txBody>
       </p:sp>
+      <p:pic>
+        <p:nvPicPr>
+          <p:cNvPr id="8" name="Picture 7">
+            <a:extLst>
+              <a:ext uri="{FF2B5EF4-FFF2-40B4-BE49-F238E27FC236}">
+                <a16:creationId xmlns:a16="http://schemas.microsoft.com/office/drawing/2014/main" id="{EB069F6C-17EF-F640-D041-C5FC652455D6}"/>
+              </a:ext>
+            </a:extLst>
+          </p:cNvPr>
+          <p:cNvPicPr>
+            <a:picLocks noChangeAspect="1"/>
+          </p:cNvPicPr>
+          <p:nvPr/>
+        </p:nvPicPr>
+        <p:blipFill>
+          <a:blip r:embed="rId5"/>
+          <a:stretch>
+            <a:fillRect/>
+          </a:stretch>
+        </p:blipFill>
+        <p:spPr>
+          <a:xfrm>
+            <a:off x="973744" y="4076488"/>
+            <a:ext cx="10973751" cy="823031"/>
+          </a:xfrm>
+          <a:prstGeom prst="rect">
+            <a:avLst/>
+          </a:prstGeom>
+        </p:spPr>
+      </p:pic>
+      <p:sp>
+        <p:nvSpPr>
+          <p:cNvPr id="9" name="TextBox 8">
+            <a:extLst>
+              <a:ext uri="{FF2B5EF4-FFF2-40B4-BE49-F238E27FC236}">
+                <a16:creationId xmlns:a16="http://schemas.microsoft.com/office/drawing/2014/main" id="{B7126E41-760A-3C91-7A48-1F87D4DFB137}"/>
+              </a:ext>
+            </a:extLst>
+          </p:cNvPr>
+          <p:cNvSpPr txBox="1"/>
+          <p:nvPr/>
+        </p:nvSpPr>
+        <p:spPr>
+          <a:xfrm>
+            <a:off x="973744" y="1757082"/>
+            <a:ext cx="2378985" cy="369332"/>
+          </a:xfrm>
+          <a:prstGeom prst="rect">
+            <a:avLst/>
+          </a:prstGeom>
+          <a:solidFill>
+            <a:schemeClr val="accent4"/>
+          </a:solidFill>
+        </p:spPr>
+        <p:txBody>
+          <a:bodyPr wrap="none" rtlCol="0">
+            <a:spAutoFit/>
+          </a:bodyPr>
+          <a:lstStyle/>
+          <a:p>
+            <a:r>
+              <a:rPr lang="en-US" dirty="0"/>
+              <a:t>Create a working folder</a:t>
+            </a:r>
+          </a:p>
+        </p:txBody>
+      </p:sp>
+      <p:sp>
+        <p:nvSpPr>
+          <p:cNvPr id="10" name="TextBox 9">
+            <a:extLst>
+              <a:ext uri="{FF2B5EF4-FFF2-40B4-BE49-F238E27FC236}">
+                <a16:creationId xmlns:a16="http://schemas.microsoft.com/office/drawing/2014/main" id="{095C1DA7-21F6-7FCE-ACAB-5651011FC42C}"/>
+              </a:ext>
+            </a:extLst>
+          </p:cNvPr>
+          <p:cNvSpPr txBox="1"/>
+          <p:nvPr/>
+        </p:nvSpPr>
+        <p:spPr>
+          <a:xfrm>
+            <a:off x="973744" y="3707156"/>
+            <a:ext cx="3835281" cy="369332"/>
+          </a:xfrm>
+          <a:prstGeom prst="rect">
+            <a:avLst/>
+          </a:prstGeom>
+          <a:solidFill>
+            <a:schemeClr val="accent4"/>
+          </a:solidFill>
+        </p:spPr>
+        <p:txBody>
+          <a:bodyPr wrap="none" rtlCol="0">
+            <a:spAutoFit/>
+          </a:bodyPr>
+          <a:lstStyle/>
+          <a:p>
+            <a:r>
+              <a:rPr lang="en-US" dirty="0"/>
+              <a:t>Copy the login page to /var/www/html</a:t>
+            </a:r>
+          </a:p>
+        </p:txBody>
+      </p:sp>
     </p:spTree>
     <p:extLst>
       <p:ext uri="{BB962C8B-B14F-4D97-AF65-F5344CB8AC3E}">
@@ -14327,7 +15540,296 @@
 </p:sld>
 </file>
 
-<file path=ppt/slides/slide5.xml><?xml version="1.0" encoding="utf-8"?>
+<file path=ppt/slides/slide6.xml><?xml version="1.0" encoding="utf-8"?>
+<p:sld xmlns:a="http://schemas.openxmlformats.org/drawingml/2006/main" xmlns:r="http://schemas.openxmlformats.org/officeDocument/2006/relationships" xmlns:p="http://schemas.openxmlformats.org/presentationml/2006/main">
+  <p:cSld>
+    <p:spTree>
+      <p:nvGrpSpPr>
+        <p:cNvPr id="1" name=""/>
+        <p:cNvGrpSpPr/>
+        <p:nvPr/>
+      </p:nvGrpSpPr>
+      <p:grpSpPr>
+        <a:xfrm>
+          <a:off x="0" y="0"/>
+          <a:ext cx="0" cy="0"/>
+          <a:chOff x="0" y="0"/>
+          <a:chExt cx="0" cy="0"/>
+        </a:xfrm>
+      </p:grpSpPr>
+      <p:pic>
+        <p:nvPicPr>
+          <p:cNvPr id="4" name="Picture 3">
+            <a:extLst>
+              <a:ext uri="{FF2B5EF4-FFF2-40B4-BE49-F238E27FC236}">
+                <a16:creationId xmlns:a16="http://schemas.microsoft.com/office/drawing/2014/main" id="{BDB3DBD8-215E-64FE-ACF6-E5B24E097559}"/>
+              </a:ext>
+            </a:extLst>
+          </p:cNvPr>
+          <p:cNvPicPr>
+            <a:picLocks noChangeAspect="1"/>
+          </p:cNvPicPr>
+          <p:nvPr/>
+        </p:nvPicPr>
+        <p:blipFill>
+          <a:blip r:embed="rId2"/>
+          <a:stretch>
+            <a:fillRect/>
+          </a:stretch>
+        </p:blipFill>
+        <p:spPr>
+          <a:xfrm>
+            <a:off x="838200" y="1949154"/>
+            <a:ext cx="6080511" cy="3438634"/>
+          </a:xfrm>
+          <a:prstGeom prst="rect">
+            <a:avLst/>
+          </a:prstGeom>
+        </p:spPr>
+      </p:pic>
+      <p:sp>
+        <p:nvSpPr>
+          <p:cNvPr id="5" name="Title 4">
+            <a:extLst>
+              <a:ext uri="{FF2B5EF4-FFF2-40B4-BE49-F238E27FC236}">
+                <a16:creationId xmlns:a16="http://schemas.microsoft.com/office/drawing/2014/main" id="{3DC15AD9-48AB-C676-CBD3-BEDA416B307F}"/>
+              </a:ext>
+            </a:extLst>
+          </p:cNvPr>
+          <p:cNvSpPr>
+            <a:spLocks noGrp="1"/>
+          </p:cNvSpPr>
+          <p:nvPr>
+            <p:ph type="title"/>
+          </p:nvPr>
+        </p:nvSpPr>
+        <p:spPr/>
+        <p:txBody>
+          <a:bodyPr/>
+          <a:lstStyle/>
+          <a:p>
+            <a:r>
+              <a:rPr lang="en-US" dirty="0"/>
+              <a:t>Verify the fake page</a:t>
+            </a:r>
+          </a:p>
+        </p:txBody>
+      </p:sp>
+    </p:spTree>
+    <p:extLst>
+      <p:ext uri="{BB962C8B-B14F-4D97-AF65-F5344CB8AC3E}">
+        <p14:creationId xmlns:p14="http://schemas.microsoft.com/office/powerpoint/2010/main" val="1410457836"/>
+      </p:ext>
+    </p:extLst>
+  </p:cSld>
+  <p:clrMapOvr>
+    <a:masterClrMapping/>
+  </p:clrMapOvr>
+</p:sld>
+</file>
+
+<file path=ppt/slides/slide7.xml><?xml version="1.0" encoding="utf-8"?>
+<p:sld xmlns:a="http://schemas.openxmlformats.org/drawingml/2006/main" xmlns:r="http://schemas.openxmlformats.org/officeDocument/2006/relationships" xmlns:p="http://schemas.openxmlformats.org/presentationml/2006/main">
+  <p:cSld>
+    <p:spTree>
+      <p:nvGrpSpPr>
+        <p:cNvPr id="1" name=""/>
+        <p:cNvGrpSpPr/>
+        <p:nvPr/>
+      </p:nvGrpSpPr>
+      <p:grpSpPr>
+        <a:xfrm>
+          <a:off x="0" y="0"/>
+          <a:ext cx="0" cy="0"/>
+          <a:chOff x="0" y="0"/>
+          <a:chExt cx="0" cy="0"/>
+        </a:xfrm>
+      </p:grpSpPr>
+      <p:sp>
+        <p:nvSpPr>
+          <p:cNvPr id="2" name="Title 1">
+            <a:extLst>
+              <a:ext uri="{FF2B5EF4-FFF2-40B4-BE49-F238E27FC236}">
+                <a16:creationId xmlns:a16="http://schemas.microsoft.com/office/drawing/2014/main" id="{1DED2B73-B5A5-0FC3-6C76-1CA7CA6FE34E}"/>
+              </a:ext>
+            </a:extLst>
+          </p:cNvPr>
+          <p:cNvSpPr>
+            <a:spLocks noGrp="1"/>
+          </p:cNvSpPr>
+          <p:nvPr>
+            <p:ph type="title"/>
+          </p:nvPr>
+        </p:nvSpPr>
+        <p:spPr/>
+        <p:txBody>
+          <a:bodyPr/>
+          <a:lstStyle/>
+          <a:p>
+            <a:r>
+              <a:rPr lang="en-US" dirty="0"/>
+              <a:t>Key components of DNS attacks</a:t>
+            </a:r>
+          </a:p>
+        </p:txBody>
+      </p:sp>
+      <p:sp>
+        <p:nvSpPr>
+          <p:cNvPr id="3" name="Content Placeholder 2">
+            <a:extLst>
+              <a:ext uri="{FF2B5EF4-FFF2-40B4-BE49-F238E27FC236}">
+                <a16:creationId xmlns:a16="http://schemas.microsoft.com/office/drawing/2014/main" id="{E8FABC38-D5BF-7154-59E7-94AC3EFBBB0A}"/>
+              </a:ext>
+            </a:extLst>
+          </p:cNvPr>
+          <p:cNvSpPr>
+            <a:spLocks noGrp="1"/>
+          </p:cNvSpPr>
+          <p:nvPr>
+            <p:ph idx="1"/>
+          </p:nvPr>
+        </p:nvSpPr>
+        <p:spPr/>
+        <p:txBody>
+          <a:bodyPr/>
+          <a:lstStyle/>
+          <a:p>
+            <a:r>
+              <a:rPr lang="en-US" dirty="0"/>
+              <a:t>ARP poisoning</a:t>
+            </a:r>
+          </a:p>
+          <a:p>
+            <a:pPr lvl="1"/>
+            <a:r>
+              <a:rPr lang="en-US" dirty="0"/>
+              <a:t>Attack (Kali) launches the Man-In-The-Middle attack</a:t>
+            </a:r>
+          </a:p>
+          <a:p>
+            <a:r>
+              <a:rPr lang="en-US" dirty="0"/>
+              <a:t>DSN spoof</a:t>
+            </a:r>
+          </a:p>
+          <a:p>
+            <a:pPr lvl="1"/>
+            <a:r>
+              <a:rPr lang="en-US" dirty="0"/>
+              <a:t>Attack (Kali) forwards the DSN query to the DSN server</a:t>
+            </a:r>
+          </a:p>
+          <a:p>
+            <a:pPr lvl="1"/>
+            <a:r>
+              <a:rPr lang="en-US" dirty="0"/>
+              <a:t>Attack (Kali) intercepts the DSN response and provides a fake IP</a:t>
+            </a:r>
+          </a:p>
+        </p:txBody>
+      </p:sp>
+    </p:spTree>
+    <p:extLst>
+      <p:ext uri="{BB962C8B-B14F-4D97-AF65-F5344CB8AC3E}">
+        <p14:creationId xmlns:p14="http://schemas.microsoft.com/office/powerpoint/2010/main" val="275395023"/>
+      </p:ext>
+    </p:extLst>
+  </p:cSld>
+  <p:clrMapOvr>
+    <a:masterClrMapping/>
+  </p:clrMapOvr>
+</p:sld>
+</file>
+
+<file path=ppt/slides/slide8.xml><?xml version="1.0" encoding="utf-8"?>
+<p:sld xmlns:a="http://schemas.openxmlformats.org/drawingml/2006/main" xmlns:r="http://schemas.openxmlformats.org/officeDocument/2006/relationships" xmlns:p="http://schemas.openxmlformats.org/presentationml/2006/main">
+  <p:cSld>
+    <p:spTree>
+      <p:nvGrpSpPr>
+        <p:cNvPr id="1" name=""/>
+        <p:cNvGrpSpPr/>
+        <p:nvPr/>
+      </p:nvGrpSpPr>
+      <p:grpSpPr>
+        <a:xfrm>
+          <a:off x="0" y="0"/>
+          <a:ext cx="0" cy="0"/>
+          <a:chOff x="0" y="0"/>
+          <a:chExt cx="0" cy="0"/>
+        </a:xfrm>
+      </p:grpSpPr>
+      <p:sp>
+        <p:nvSpPr>
+          <p:cNvPr id="2" name="Title 1">
+            <a:extLst>
+              <a:ext uri="{FF2B5EF4-FFF2-40B4-BE49-F238E27FC236}">
+                <a16:creationId xmlns:a16="http://schemas.microsoft.com/office/drawing/2014/main" id="{72509EB9-51CC-2DC5-4B50-E225C35AC752}"/>
+              </a:ext>
+            </a:extLst>
+          </p:cNvPr>
+          <p:cNvSpPr>
+            <a:spLocks noGrp="1"/>
+          </p:cNvSpPr>
+          <p:nvPr>
+            <p:ph type="title"/>
+          </p:nvPr>
+        </p:nvSpPr>
+        <p:spPr/>
+        <p:txBody>
+          <a:bodyPr/>
+          <a:lstStyle/>
+          <a:p>
+            <a:r>
+              <a:rPr lang="en-US" dirty="0"/>
+              <a:t>Download two files</a:t>
+            </a:r>
+          </a:p>
+        </p:txBody>
+      </p:sp>
+      <p:pic>
+        <p:nvPicPr>
+          <p:cNvPr id="6" name="Picture 5">
+            <a:extLst>
+              <a:ext uri="{FF2B5EF4-FFF2-40B4-BE49-F238E27FC236}">
+                <a16:creationId xmlns:a16="http://schemas.microsoft.com/office/drawing/2014/main" id="{74E62257-DC7A-D4F8-63EA-272BA93A89C7}"/>
+              </a:ext>
+            </a:extLst>
+          </p:cNvPr>
+          <p:cNvPicPr>
+            <a:picLocks noChangeAspect="1"/>
+          </p:cNvPicPr>
+          <p:nvPr/>
+        </p:nvPicPr>
+        <p:blipFill>
+          <a:blip r:embed="rId3"/>
+          <a:stretch>
+            <a:fillRect/>
+          </a:stretch>
+        </p:blipFill>
+        <p:spPr>
+          <a:xfrm>
+            <a:off x="571021" y="2343056"/>
+            <a:ext cx="11049958" cy="2171888"/>
+          </a:xfrm>
+          <a:prstGeom prst="rect">
+            <a:avLst/>
+          </a:prstGeom>
+        </p:spPr>
+      </p:pic>
+    </p:spTree>
+    <p:extLst>
+      <p:ext uri="{BB962C8B-B14F-4D97-AF65-F5344CB8AC3E}">
+        <p14:creationId xmlns:p14="http://schemas.microsoft.com/office/powerpoint/2010/main" val="3350146509"/>
+      </p:ext>
+    </p:extLst>
+  </p:cSld>
+  <p:clrMapOvr>
+    <a:masterClrMapping/>
+  </p:clrMapOvr>
+</p:sld>
+</file>
+
+<file path=ppt/slides/slide9.xml><?xml version="1.0" encoding="utf-8"?>
 <p:sld xmlns:a="http://schemas.openxmlformats.org/drawingml/2006/main" xmlns:r="http://schemas.openxmlformats.org/officeDocument/2006/relationships" xmlns:p="http://schemas.openxmlformats.org/presentationml/2006/main">
   <p:cSld>
     <p:spTree>

</xml_diff>

<commit_message>
create a separate section for networking forensics! May revise later!
</commit_message>
<xml_diff>
--- a/Networking_Forensics/80_DNS_Spoof_Forensics.pptx
+++ b/Networking_Forensics/80_DNS_Spoof_Forensics.pptx
@@ -5,7 +5,7 @@
     <p:sldMasterId id="2147483648" r:id="rId1"/>
   </p:sldMasterIdLst>
   <p:notesMasterIdLst>
-    <p:notesMasterId r:id="rId16"/>
+    <p:notesMasterId r:id="rId18"/>
   </p:notesMasterIdLst>
   <p:sldIdLst>
     <p:sldId id="256" r:id="rId2"/>
@@ -22,6 +22,8 @@
     <p:sldId id="544" r:id="rId13"/>
     <p:sldId id="545" r:id="rId14"/>
     <p:sldId id="546" r:id="rId15"/>
+    <p:sldId id="547" r:id="rId16"/>
+    <p:sldId id="548" r:id="rId17"/>
   </p:sldIdLst>
   <p:sldSz cx="12192000" cy="6858000"/>
   <p:notesSz cx="6858000" cy="9144000"/>
@@ -132,7 +134,6 @@
 <p1510:revInfo xmlns:a="http://schemas.openxmlformats.org/drawingml/2006/main" xmlns:r="http://schemas.openxmlformats.org/officeDocument/2006/relationships" xmlns:p1510="http://schemas.microsoft.com/office/powerpoint/2015/10/main">
   <p1510:revLst>
     <p1510:client id="{DD1FDF10-7D46-46BB-AFF8-9771F1571229}" v="4" dt="2023-03-16T03:13:09.605"/>
-    <p1510:client id="{EC5FAB8D-8A6B-47C4-B6ED-4448F2E7B7E9}" v="117" dt="2023-03-15T03:39:04.808"/>
   </p1510:revLst>
 </p1510:revInfo>
 </file>
@@ -9624,7 +9625,7 @@
   <pc:docChgLst>
     <pc:chgData name="Weifeng Xu" userId="e7aed605-a3dd-4d5a-a692-a87037af107b" providerId="ADAL" clId="{DD1FDF10-7D46-46BB-AFF8-9771F1571229}"/>
     <pc:docChg chg="undo custSel addSld delSld modSld sldOrd">
-      <pc:chgData name="Weifeng Xu" userId="e7aed605-a3dd-4d5a-a692-a87037af107b" providerId="ADAL" clId="{DD1FDF10-7D46-46BB-AFF8-9771F1571229}" dt="2023-03-16T03:22:18.255" v="889" actId="1076"/>
+      <pc:chgData name="Weifeng Xu" userId="e7aed605-a3dd-4d5a-a692-a87037af107b" providerId="ADAL" clId="{DD1FDF10-7D46-46BB-AFF8-9771F1571229}" dt="2023-03-17T13:32:50.175" v="952" actId="20577"/>
       <pc:docMkLst>
         <pc:docMk/>
       </pc:docMkLst>
@@ -10145,6 +10146,60 @@
             <ac:picMk id="3" creationId="{EDF95C69-3BFB-5E14-5875-FA5044DF6F4F}"/>
           </ac:picMkLst>
         </pc:picChg>
+      </pc:sldChg>
+      <pc:sldChg chg="addSp modSp new mod modClrScheme chgLayout">
+        <pc:chgData name="Weifeng Xu" userId="e7aed605-a3dd-4d5a-a692-a87037af107b" providerId="ADAL" clId="{DD1FDF10-7D46-46BB-AFF8-9771F1571229}" dt="2023-03-17T13:30:22.464" v="933" actId="20577"/>
+        <pc:sldMkLst>
+          <pc:docMk/>
+          <pc:sldMk cId="3233937569" sldId="547"/>
+        </pc:sldMkLst>
+        <pc:spChg chg="add mod">
+          <ac:chgData name="Weifeng Xu" userId="e7aed605-a3dd-4d5a-a692-a87037af107b" providerId="ADAL" clId="{DD1FDF10-7D46-46BB-AFF8-9771F1571229}" dt="2023-03-17T13:30:22.464" v="933" actId="20577"/>
+          <ac:spMkLst>
+            <pc:docMk/>
+            <pc:sldMk cId="3233937569" sldId="547"/>
+            <ac:spMk id="2" creationId="{8C07D4E7-25E6-938A-F5CD-35FAED33C312}"/>
+          </ac:spMkLst>
+        </pc:spChg>
+        <pc:spChg chg="add mod">
+          <ac:chgData name="Weifeng Xu" userId="e7aed605-a3dd-4d5a-a692-a87037af107b" providerId="ADAL" clId="{DD1FDF10-7D46-46BB-AFF8-9771F1571229}" dt="2023-03-17T13:29:40.880" v="891" actId="700"/>
+          <ac:spMkLst>
+            <pc:docMk/>
+            <pc:sldMk cId="3233937569" sldId="547"/>
+            <ac:spMk id="3" creationId="{2E33F6DA-D7D9-AE4A-0AE8-C69D5F52F8CE}"/>
+          </ac:spMkLst>
+        </pc:spChg>
+      </pc:sldChg>
+      <pc:sldChg chg="addSp delSp modSp new mod modClrScheme chgLayout">
+        <pc:chgData name="Weifeng Xu" userId="e7aed605-a3dd-4d5a-a692-a87037af107b" providerId="ADAL" clId="{DD1FDF10-7D46-46BB-AFF8-9771F1571229}" dt="2023-03-17T13:32:50.175" v="952" actId="20577"/>
+        <pc:sldMkLst>
+          <pc:docMk/>
+          <pc:sldMk cId="1287229698" sldId="548"/>
+        </pc:sldMkLst>
+        <pc:spChg chg="del mod ord">
+          <ac:chgData name="Weifeng Xu" userId="e7aed605-a3dd-4d5a-a692-a87037af107b" providerId="ADAL" clId="{DD1FDF10-7D46-46BB-AFF8-9771F1571229}" dt="2023-03-17T13:32:42.351" v="935" actId="700"/>
+          <ac:spMkLst>
+            <pc:docMk/>
+            <pc:sldMk cId="1287229698" sldId="548"/>
+            <ac:spMk id="2" creationId="{64BA5440-EDAF-EA1E-A3EE-AFE3F6075FFF}"/>
+          </ac:spMkLst>
+        </pc:spChg>
+        <pc:spChg chg="del">
+          <ac:chgData name="Weifeng Xu" userId="e7aed605-a3dd-4d5a-a692-a87037af107b" providerId="ADAL" clId="{DD1FDF10-7D46-46BB-AFF8-9771F1571229}" dt="2023-03-17T13:32:42.351" v="935" actId="700"/>
+          <ac:spMkLst>
+            <pc:docMk/>
+            <pc:sldMk cId="1287229698" sldId="548"/>
+            <ac:spMk id="3" creationId="{22E60BAF-8583-7673-813E-45C137ECF3DA}"/>
+          </ac:spMkLst>
+        </pc:spChg>
+        <pc:spChg chg="add mod ord">
+          <ac:chgData name="Weifeng Xu" userId="e7aed605-a3dd-4d5a-a692-a87037af107b" providerId="ADAL" clId="{DD1FDF10-7D46-46BB-AFF8-9771F1571229}" dt="2023-03-17T13:32:50.175" v="952" actId="20577"/>
+          <ac:spMkLst>
+            <pc:docMk/>
+            <pc:sldMk cId="1287229698" sldId="548"/>
+            <ac:spMk id="4" creationId="{80E21DCD-5A0C-C39B-F3FF-348D0E0BF248}"/>
+          </ac:spMkLst>
+        </pc:spChg>
       </pc:sldChg>
     </pc:docChg>
   </pc:docChgLst>
@@ -10233,7 +10288,7 @@
           <a:p>
             <a:fld id="{EE41F6E3-57F9-402E-BDBA-5B2DE11C8530}" type="datetimeFigureOut">
               <a:rPr lang="en-US" smtClean="0"/>
-              <a:t>3/15/2023</a:t>
+              <a:t>3/17/2023</a:t>
             </a:fld>
             <a:endParaRPr lang="en-US"/>
           </a:p>
@@ -11011,7 +11066,7 @@
           <a:p>
             <a:fld id="{4263717A-E3C1-4BED-ABE0-B7069385E023}" type="datetimeFigureOut">
               <a:rPr lang="en-US" smtClean="0"/>
-              <a:t>3/15/2023</a:t>
+              <a:t>3/17/2023</a:t>
             </a:fld>
             <a:endParaRPr lang="en-US"/>
           </a:p>
@@ -11184,7 +11239,7 @@
           <a:p>
             <a:fld id="{4263717A-E3C1-4BED-ABE0-B7069385E023}" type="datetimeFigureOut">
               <a:rPr lang="en-US" smtClean="0"/>
-              <a:t>3/15/2023</a:t>
+              <a:t>3/17/2023</a:t>
             </a:fld>
             <a:endParaRPr lang="en-US"/>
           </a:p>
@@ -11362,7 +11417,7 @@
           <a:p>
             <a:fld id="{4263717A-E3C1-4BED-ABE0-B7069385E023}" type="datetimeFigureOut">
               <a:rPr lang="en-US" smtClean="0"/>
-              <a:t>3/15/2023</a:t>
+              <a:t>3/17/2023</a:t>
             </a:fld>
             <a:endParaRPr lang="en-US"/>
           </a:p>
@@ -11530,7 +11585,7 @@
           <a:p>
             <a:fld id="{4263717A-E3C1-4BED-ABE0-B7069385E023}" type="datetimeFigureOut">
               <a:rPr lang="en-US" smtClean="0"/>
-              <a:t>3/15/2023</a:t>
+              <a:t>3/17/2023</a:t>
             </a:fld>
             <a:endParaRPr lang="en-US"/>
           </a:p>
@@ -11775,7 +11830,7 @@
           <a:p>
             <a:fld id="{4263717A-E3C1-4BED-ABE0-B7069385E023}" type="datetimeFigureOut">
               <a:rPr lang="en-US" smtClean="0"/>
-              <a:t>3/15/2023</a:t>
+              <a:t>3/17/2023</a:t>
             </a:fld>
             <a:endParaRPr lang="en-US"/>
           </a:p>
@@ -12004,7 +12059,7 @@
           <a:p>
             <a:fld id="{4263717A-E3C1-4BED-ABE0-B7069385E023}" type="datetimeFigureOut">
               <a:rPr lang="en-US" smtClean="0"/>
-              <a:t>3/15/2023</a:t>
+              <a:t>3/17/2023</a:t>
             </a:fld>
             <a:endParaRPr lang="en-US"/>
           </a:p>
@@ -12368,7 +12423,7 @@
           <a:p>
             <a:fld id="{4263717A-E3C1-4BED-ABE0-B7069385E023}" type="datetimeFigureOut">
               <a:rPr lang="en-US" smtClean="0"/>
-              <a:t>3/15/2023</a:t>
+              <a:t>3/17/2023</a:t>
             </a:fld>
             <a:endParaRPr lang="en-US"/>
           </a:p>
@@ -12485,7 +12540,7 @@
           <a:p>
             <a:fld id="{4263717A-E3C1-4BED-ABE0-B7069385E023}" type="datetimeFigureOut">
               <a:rPr lang="en-US" smtClean="0"/>
-              <a:t>3/15/2023</a:t>
+              <a:t>3/17/2023</a:t>
             </a:fld>
             <a:endParaRPr lang="en-US"/>
           </a:p>
@@ -12580,7 +12635,7 @@
           <a:p>
             <a:fld id="{4263717A-E3C1-4BED-ABE0-B7069385E023}" type="datetimeFigureOut">
               <a:rPr lang="en-US" smtClean="0"/>
-              <a:t>3/15/2023</a:t>
+              <a:t>3/17/2023</a:t>
             </a:fld>
             <a:endParaRPr lang="en-US"/>
           </a:p>
@@ -12855,7 +12910,7 @@
           <a:p>
             <a:fld id="{4263717A-E3C1-4BED-ABE0-B7069385E023}" type="datetimeFigureOut">
               <a:rPr lang="en-US" smtClean="0"/>
-              <a:t>3/15/2023</a:t>
+              <a:t>3/17/2023</a:t>
             </a:fld>
             <a:endParaRPr lang="en-US"/>
           </a:p>
@@ -13107,7 +13162,7 @@
           <a:p>
             <a:fld id="{4263717A-E3C1-4BED-ABE0-B7069385E023}" type="datetimeFigureOut">
               <a:rPr lang="en-US" smtClean="0"/>
-              <a:t>3/15/2023</a:t>
+              <a:t>3/17/2023</a:t>
             </a:fld>
             <a:endParaRPr lang="en-US"/>
           </a:p>
@@ -13318,7 +13373,7 @@
           <a:p>
             <a:fld id="{4263717A-E3C1-4BED-ABE0-B7069385E023}" type="datetimeFigureOut">
               <a:rPr lang="en-US" smtClean="0"/>
-              <a:t>3/15/2023</a:t>
+              <a:t>3/17/2023</a:t>
             </a:fld>
             <a:endParaRPr lang="en-US"/>
           </a:p>
@@ -14458,6 +14513,151 @@
     <p:extLst>
       <p:ext uri="{BB962C8B-B14F-4D97-AF65-F5344CB8AC3E}">
         <p14:creationId xmlns:p14="http://schemas.microsoft.com/office/powerpoint/2010/main" val="3761317368"/>
+      </p:ext>
+    </p:extLst>
+  </p:cSld>
+  <p:clrMapOvr>
+    <a:masterClrMapping/>
+  </p:clrMapOvr>
+</p:sld>
+</file>
+
+<file path=ppt/slides/slide15.xml><?xml version="1.0" encoding="utf-8"?>
+<p:sld xmlns:a="http://schemas.openxmlformats.org/drawingml/2006/main" xmlns:r="http://schemas.openxmlformats.org/officeDocument/2006/relationships" xmlns:p="http://schemas.openxmlformats.org/presentationml/2006/main">
+  <p:cSld>
+    <p:spTree>
+      <p:nvGrpSpPr>
+        <p:cNvPr id="1" name=""/>
+        <p:cNvGrpSpPr/>
+        <p:nvPr/>
+      </p:nvGrpSpPr>
+      <p:grpSpPr>
+        <a:xfrm>
+          <a:off x="0" y="0"/>
+          <a:ext cx="0" cy="0"/>
+          <a:chOff x="0" y="0"/>
+          <a:chExt cx="0" cy="0"/>
+        </a:xfrm>
+      </p:grpSpPr>
+      <p:sp>
+        <p:nvSpPr>
+          <p:cNvPr id="2" name="Title 1">
+            <a:extLst>
+              <a:ext uri="{FF2B5EF4-FFF2-40B4-BE49-F238E27FC236}">
+                <a16:creationId xmlns:a16="http://schemas.microsoft.com/office/drawing/2014/main" id="{8C07D4E7-25E6-938A-F5CD-35FAED33C312}"/>
+              </a:ext>
+            </a:extLst>
+          </p:cNvPr>
+          <p:cNvSpPr>
+            <a:spLocks noGrp="1"/>
+          </p:cNvSpPr>
+          <p:nvPr>
+            <p:ph type="title"/>
+          </p:nvPr>
+        </p:nvSpPr>
+        <p:spPr/>
+        <p:txBody>
+          <a:bodyPr/>
+          <a:lstStyle/>
+          <a:p>
+            <a:r>
+              <a:rPr lang="en-US" dirty="0"/>
+              <a:t>Analyze DNS spoof traffic</a:t>
+            </a:r>
+          </a:p>
+        </p:txBody>
+      </p:sp>
+      <p:sp>
+        <p:nvSpPr>
+          <p:cNvPr id="3" name="Text Placeholder 2">
+            <a:extLst>
+              <a:ext uri="{FF2B5EF4-FFF2-40B4-BE49-F238E27FC236}">
+                <a16:creationId xmlns:a16="http://schemas.microsoft.com/office/drawing/2014/main" id="{2E33F6DA-D7D9-AE4A-0AE8-C69D5F52F8CE}"/>
+              </a:ext>
+            </a:extLst>
+          </p:cNvPr>
+          <p:cNvSpPr>
+            <a:spLocks noGrp="1"/>
+          </p:cNvSpPr>
+          <p:nvPr>
+            <p:ph type="body" idx="1"/>
+          </p:nvPr>
+        </p:nvSpPr>
+        <p:spPr/>
+        <p:txBody>
+          <a:bodyPr/>
+          <a:lstStyle/>
+          <a:p>
+            <a:endParaRPr lang="en-US"/>
+          </a:p>
+        </p:txBody>
+      </p:sp>
+    </p:spTree>
+    <p:extLst>
+      <p:ext uri="{BB962C8B-B14F-4D97-AF65-F5344CB8AC3E}">
+        <p14:creationId xmlns:p14="http://schemas.microsoft.com/office/powerpoint/2010/main" val="3233937569"/>
+      </p:ext>
+    </p:extLst>
+  </p:cSld>
+  <p:clrMapOvr>
+    <a:masterClrMapping/>
+  </p:clrMapOvr>
+</p:sld>
+</file>
+
+<file path=ppt/slides/slide16.xml><?xml version="1.0" encoding="utf-8"?>
+<p:sld xmlns:a="http://schemas.openxmlformats.org/drawingml/2006/main" xmlns:r="http://schemas.openxmlformats.org/officeDocument/2006/relationships" xmlns:p="http://schemas.openxmlformats.org/presentationml/2006/main">
+  <p:cSld>
+    <p:spTree>
+      <p:nvGrpSpPr>
+        <p:cNvPr id="1" name=""/>
+        <p:cNvGrpSpPr/>
+        <p:nvPr/>
+      </p:nvGrpSpPr>
+      <p:grpSpPr>
+        <a:xfrm>
+          <a:off x="0" y="0"/>
+          <a:ext cx="0" cy="0"/>
+          <a:chOff x="0" y="0"/>
+          <a:chExt cx="0" cy="0"/>
+        </a:xfrm>
+      </p:grpSpPr>
+      <p:sp>
+        <p:nvSpPr>
+          <p:cNvPr id="4" name="Title 3">
+            <a:extLst>
+              <a:ext uri="{FF2B5EF4-FFF2-40B4-BE49-F238E27FC236}">
+                <a16:creationId xmlns:a16="http://schemas.microsoft.com/office/drawing/2014/main" id="{80E21DCD-5A0C-C39B-F3FF-348D0E0BF248}"/>
+              </a:ext>
+            </a:extLst>
+          </p:cNvPr>
+          <p:cNvSpPr>
+            <a:spLocks noGrp="1"/>
+          </p:cNvSpPr>
+          <p:nvPr>
+            <p:ph type="title"/>
+          </p:nvPr>
+        </p:nvSpPr>
+        <p:spPr/>
+        <p:txBody>
+          <a:bodyPr/>
+          <a:lstStyle/>
+          <a:p>
+            <a:r>
+              <a:rPr lang="en-US" dirty="0"/>
+              <a:t>Will work </a:t>
+            </a:r>
+            <a:r>
+              <a:rPr lang="en-US"/>
+              <a:t>on this</a:t>
+            </a:r>
+          </a:p>
+        </p:txBody>
+      </p:sp>
+    </p:spTree>
+    <p:extLst>
+      <p:ext uri="{BB962C8B-B14F-4D97-AF65-F5344CB8AC3E}">
+        <p14:creationId xmlns:p14="http://schemas.microsoft.com/office/powerpoint/2010/main" val="1287229698"/>
       </p:ext>
     </p:extLst>
   </p:cSld>

</xml_diff>